<commit_message>
Uj logo - back
</commit_message>
<xml_diff>
--- a/documentation/PPT/TerFelSzoft.pptx
+++ b/documentation/PPT/TerFelSzoft.pptx
@@ -5,10 +5,10 @@
     <p:sldMasterId id="2147483648" r:id="rId1"/>
   </p:sldMasterIdLst>
   <p:notesMasterIdLst>
-    <p:notesMasterId r:id="rId19"/>
+    <p:notesMasterId r:id="rId18"/>
   </p:notesMasterIdLst>
   <p:handoutMasterIdLst>
-    <p:handoutMasterId r:id="rId20"/>
+    <p:handoutMasterId r:id="rId19"/>
   </p:handoutMasterIdLst>
   <p:sldIdLst>
     <p:sldId id="256" r:id="rId2"/>
@@ -27,7 +27,6 @@
     <p:sldId id="281" r:id="rId15"/>
     <p:sldId id="273" r:id="rId16"/>
     <p:sldId id="277" r:id="rId17"/>
-    <p:sldId id="282" r:id="rId18"/>
   </p:sldIdLst>
   <p:sldSz cx="12192000" cy="6858000"/>
   <p:notesSz cx="6858000" cy="9144000"/>
@@ -2209,92 +2208,6 @@
 </p:notes>
 </file>
 
-<file path=ppt/notesSlides/notesSlide17.xml><?xml version="1.0" encoding="utf-8"?>
-<p:notes xmlns:a="http://schemas.openxmlformats.org/drawingml/2006/main" xmlns:r="http://schemas.openxmlformats.org/officeDocument/2006/relationships" xmlns:p="http://schemas.openxmlformats.org/presentationml/2006/main">
-  <p:cSld>
-    <p:spTree>
-      <p:nvGrpSpPr>
-        <p:cNvPr id="1" name=""/>
-        <p:cNvGrpSpPr/>
-        <p:nvPr/>
-      </p:nvGrpSpPr>
-      <p:grpSpPr>
-        <a:xfrm>
-          <a:off x="0" y="0"/>
-          <a:ext cx="0" cy="0"/>
-          <a:chOff x="0" y="0"/>
-          <a:chExt cx="0" cy="0"/>
-        </a:xfrm>
-      </p:grpSpPr>
-      <p:sp>
-        <p:nvSpPr>
-          <p:cNvPr id="2" name="Diakép helye 1"/>
-          <p:cNvSpPr>
-            <a:spLocks noGrp="1" noRot="1" noChangeAspect="1"/>
-          </p:cNvSpPr>
-          <p:nvPr>
-            <p:ph type="sldImg"/>
-          </p:nvPr>
-        </p:nvSpPr>
-        <p:spPr/>
-      </p:sp>
-      <p:sp>
-        <p:nvSpPr>
-          <p:cNvPr id="3" name="Jegyzetek helye 2"/>
-          <p:cNvSpPr>
-            <a:spLocks noGrp="1"/>
-          </p:cNvSpPr>
-          <p:nvPr>
-            <p:ph type="body" idx="1"/>
-          </p:nvPr>
-        </p:nvSpPr>
-        <p:spPr/>
-        <p:txBody>
-          <a:bodyPr rtlCol="0"/>
-          <a:lstStyle/>
-          <a:p>
-            <a:pPr rtl="0"/>
-            <a:endParaRPr lang="hu-HU" dirty="0"/>
-          </a:p>
-        </p:txBody>
-      </p:sp>
-      <p:sp>
-        <p:nvSpPr>
-          <p:cNvPr id="4" name="Dia számának helye 3"/>
-          <p:cNvSpPr>
-            <a:spLocks noGrp="1"/>
-          </p:cNvSpPr>
-          <p:nvPr>
-            <p:ph type="sldNum" sz="quarter" idx="10"/>
-          </p:nvPr>
-        </p:nvSpPr>
-        <p:spPr/>
-        <p:txBody>
-          <a:bodyPr rtlCol="0"/>
-          <a:lstStyle/>
-          <a:p>
-            <a:pPr rtl="0"/>
-            <a:fld id="{6FC40A10-6036-4879-816D-55C01FC94846}" type="slidenum">
-              <a:rPr lang="hu-HU" smtClean="0"/>
-              <a:t>17</a:t>
-            </a:fld>
-            <a:endParaRPr lang="hu-HU" dirty="0"/>
-          </a:p>
-        </p:txBody>
-      </p:sp>
-    </p:spTree>
-    <p:extLst>
-      <p:ext uri="{BB962C8B-B14F-4D97-AF65-F5344CB8AC3E}">
-        <p14:creationId xmlns:p14="http://schemas.microsoft.com/office/powerpoint/2010/main" val="3725286348"/>
-      </p:ext>
-    </p:extLst>
-  </p:cSld>
-  <p:clrMapOvr>
-    <a:masterClrMapping/>
-  </p:clrMapOvr>
-</p:notes>
-</file>
-
 <file path=ppt/notesSlides/notesSlide2.xml><?xml version="1.0" encoding="utf-8"?>
 <p:notes xmlns:a="http://schemas.openxmlformats.org/drawingml/2006/main" xmlns:r="http://schemas.openxmlformats.org/officeDocument/2006/relationships" xmlns:p="http://schemas.openxmlformats.org/presentationml/2006/main">
   <p:cSld>
@@ -31725,7 +31638,7 @@
             <a:blip r:embed="rId2">
               <a:extLst>
                 <a:ext uri="{96DAC541-7B7A-43D3-8B79-37D633B846F1}">
-                  <asvg:svgBlip xmlns:asvg="http://schemas.microsoft.com/office/drawing/2016/SVG/main" xmlns="" r:embed="rId3"/>
+                  <asvg:svgBlip xmlns="" xmlns:asvg="http://schemas.microsoft.com/office/drawing/2016/SVG/main" r:embed="rId3"/>
                 </a:ext>
               </a:extLst>
             </a:blip>
@@ -42262,7 +42175,7 @@
             <a:blip r:embed="rId2">
               <a:extLst>
                 <a:ext uri="{96DAC541-7B7A-43D3-8B79-37D633B846F1}">
-                  <asvg:svgBlip xmlns:asvg="http://schemas.microsoft.com/office/drawing/2016/SVG/main" xmlns="" r:embed="rId3"/>
+                  <asvg:svgBlip xmlns="" xmlns:asvg="http://schemas.microsoft.com/office/drawing/2016/SVG/main" r:embed="rId3"/>
                 </a:ext>
               </a:extLst>
             </a:blip>
@@ -46509,7 +46422,7 @@
                 <a14:useLocalDpi xmlns:a14="http://schemas.microsoft.com/office/drawing/2010/main" val="0"/>
               </a:ext>
               <a:ext uri="{96DAC541-7B7A-43D3-8B79-37D633B846F1}">
-                <asvg:svgBlip xmlns:asvg="http://schemas.microsoft.com/office/drawing/2016/SVG/main" xmlns="" r:embed="rId4"/>
+                <asvg:svgBlip xmlns="" xmlns:asvg="http://schemas.microsoft.com/office/drawing/2016/SVG/main" r:embed="rId4"/>
               </a:ext>
             </a:extLst>
           </a:blip>
@@ -47330,7 +47243,7 @@
                 <a14:useLocalDpi xmlns:a14="http://schemas.microsoft.com/office/drawing/2010/main" val="0"/>
               </a:ext>
               <a:ext uri="{96DAC541-7B7A-43D3-8B79-37D633B846F1}">
-                <asvg:svgBlip xmlns:asvg="http://schemas.microsoft.com/office/drawing/2016/SVG/main" xmlns="" r:embed="rId4"/>
+                <asvg:svgBlip xmlns="" xmlns:asvg="http://schemas.microsoft.com/office/drawing/2016/SVG/main" r:embed="rId4"/>
               </a:ext>
             </a:extLst>
           </a:blip>
@@ -47954,7 +47867,7 @@
                 <a14:useLocalDpi xmlns:a14="http://schemas.microsoft.com/office/drawing/2010/main" val="0"/>
               </a:ext>
               <a:ext uri="{96DAC541-7B7A-43D3-8B79-37D633B846F1}">
-                <asvg:svgBlip xmlns:asvg="http://schemas.microsoft.com/office/drawing/2016/SVG/main" xmlns="" r:embed="rId4"/>
+                <asvg:svgBlip xmlns="" xmlns:asvg="http://schemas.microsoft.com/office/drawing/2016/SVG/main" r:embed="rId4"/>
               </a:ext>
             </a:extLst>
           </a:blip>
@@ -48626,7 +48539,7 @@
                 <a14:useLocalDpi xmlns:a14="http://schemas.microsoft.com/office/drawing/2010/main" val="0"/>
               </a:ext>
               <a:ext uri="{96DAC541-7B7A-43D3-8B79-37D633B846F1}">
-                <asvg:svgBlip xmlns:asvg="http://schemas.microsoft.com/office/drawing/2016/SVG/main" xmlns="" r:embed="rId4"/>
+                <asvg:svgBlip xmlns="" xmlns:asvg="http://schemas.microsoft.com/office/drawing/2016/SVG/main" r:embed="rId4"/>
               </a:ext>
             </a:extLst>
           </a:blip>
@@ -48850,7 +48763,7 @@
       </p:pic>
       <p:pic>
         <p:nvPicPr>
-          <p:cNvPr id="10" name="Kép helyőrzője 9" descr="Céges embléma">
+          <p:cNvPr id="10" name="Kép helyőrzője 9">
             <a:extLst>
               <a:ext uri="{FF2B5EF4-FFF2-40B4-BE49-F238E27FC236}">
                 <a16:creationId xmlns:a16="http://schemas.microsoft.com/office/drawing/2014/main" id="{F134DE68-610E-4EEB-B74B-452C1FAC1DAE}"/>
@@ -48870,8 +48783,40 @@
               <a:ext uri="{28A0092B-C50C-407E-A947-70E740481C1C}">
                 <a14:useLocalDpi xmlns:a14="http://schemas.microsoft.com/office/drawing/2010/main" val="0"/>
               </a:ext>
-              <a:ext uri="{96DAC541-7B7A-43D3-8B79-37D633B846F1}">
-                <asvg:svgBlip xmlns:asvg="http://schemas.microsoft.com/office/drawing/2016/SVG/main" xmlns="" r:embed="rId5"/>
+            </a:extLst>
+          </a:blip>
+          <a:stretch>
+            <a:fillRect/>
+          </a:stretch>
+        </p:blipFill>
+        <p:spPr>
+          <a:xfrm>
+            <a:off x="0" y="0"/>
+            <a:ext cx="1328400" cy="1328400"/>
+          </a:xfrm>
+        </p:spPr>
+      </p:pic>
+      <p:pic>
+        <p:nvPicPr>
+          <p:cNvPr id="21" name="Kép helyőrzője 20" descr="Absztrakt háttér">
+            <a:extLst>
+              <a:ext uri="{FF2B5EF4-FFF2-40B4-BE49-F238E27FC236}">
+                <a16:creationId xmlns:a16="http://schemas.microsoft.com/office/drawing/2014/main" id="{CFD930F2-FED4-475C-A75D-6AB046729949}"/>
+              </a:ext>
+            </a:extLst>
+          </p:cNvPr>
+          <p:cNvPicPr>
+            <a:picLocks noGrp="1" noChangeAspect="1"/>
+          </p:cNvPicPr>
+          <p:nvPr>
+            <p:ph type="pic" sz="quarter" idx="14"/>
+          </p:nvPr>
+        </p:nvPicPr>
+        <p:blipFill>
+          <a:blip r:embed="rId5">
+            <a:extLst>
+              <a:ext uri="{28A0092B-C50C-407E-A947-70E740481C1C}">
+                <a14:useLocalDpi xmlns:a14="http://schemas.microsoft.com/office/drawing/2010/main" val="0"/>
               </a:ext>
             </a:extLst>
           </a:blip>
@@ -48882,37 +48827,6 @@
         </p:blipFill>
         <p:spPr/>
       </p:pic>
-      <p:pic>
-        <p:nvPicPr>
-          <p:cNvPr id="21" name="Kép helyőrzője 20" descr="Absztrakt háttér">
-            <a:extLst>
-              <a:ext uri="{FF2B5EF4-FFF2-40B4-BE49-F238E27FC236}">
-                <a16:creationId xmlns:a16="http://schemas.microsoft.com/office/drawing/2014/main" id="{CFD930F2-FED4-475C-A75D-6AB046729949}"/>
-              </a:ext>
-            </a:extLst>
-          </p:cNvPr>
-          <p:cNvPicPr>
-            <a:picLocks noGrp="1" noChangeAspect="1"/>
-          </p:cNvPicPr>
-          <p:nvPr>
-            <p:ph type="pic" sz="quarter" idx="14"/>
-          </p:nvPr>
-        </p:nvPicPr>
-        <p:blipFill>
-          <a:blip r:embed="rId6">
-            <a:extLst>
-              <a:ext uri="{28A0092B-C50C-407E-A947-70E740481C1C}">
-                <a14:useLocalDpi xmlns:a14="http://schemas.microsoft.com/office/drawing/2010/main" val="0"/>
-              </a:ext>
-            </a:extLst>
-          </a:blip>
-          <a:srcRect/>
-          <a:stretch>
-            <a:fillRect/>
-          </a:stretch>
-        </p:blipFill>
-        <p:spPr/>
-      </p:pic>
       <p:sp>
         <p:nvSpPr>
           <p:cNvPr id="5" name="Cím 4">
@@ -49459,7 +49373,7 @@
             <a:pPr rtl="0"/>
             <a:r>
               <a:rPr lang="hu-HU" dirty="0" smtClean="0"/>
-              <a:t>ÉLŐLÁB HOZZÁADÁSA</a:t>
+              <a:t>Weboldal mobilverzió</a:t>
             </a:r>
             <a:endParaRPr lang="hu-HU" dirty="0"/>
           </a:p>
@@ -49489,7 +49403,7 @@
             <a:pPr rtl="0"/>
             <a:r>
               <a:rPr lang="hu-HU" dirty="0" smtClean="0"/>
-              <a:t>20XX.HH.NN </a:t>
+              <a:t>2022.12.01 </a:t>
             </a:r>
             <a:endParaRPr lang="hu-HU" dirty="0"/>
           </a:p>
@@ -49504,7 +49418,7 @@
           <p:nvPr/>
         </p:nvPicPr>
         <p:blipFill rotWithShape="1">
-          <a:blip r:embed="rId7"/>
+          <a:blip r:embed="rId6"/>
           <a:srcRect b="21484"/>
           <a:stretch/>
         </p:blipFill>
@@ -49804,11 +49718,7 @@
           <a:p>
             <a:r>
               <a:rPr lang="hu-HU" dirty="0"/>
-              <a:t>GitHub</a:t>
-            </a:r>
-            <a:r>
-              <a:rPr lang="hu-HU" dirty="0"/>
-              <a:t>: </a:t>
+              <a:t>GitHub: </a:t>
             </a:r>
             <a:r>
               <a:rPr lang="hu-HU" dirty="0">
@@ -49979,15 +49889,7 @@
             </a:r>
             <a:r>
               <a:rPr lang="hu-HU" dirty="0"/>
-              <a:t>tulajdonos: </a:t>
-            </a:r>
-            <a:r>
-              <a:rPr lang="hu-HU" dirty="0"/>
-              <a:t>Morning</a:t>
-            </a:r>
-            <a:r>
-              <a:rPr lang="hu-HU" dirty="0"/>
-              <a:t> Wood IT </a:t>
+              <a:t>tulajdonos: Morning Wood IT </a:t>
             </a:r>
             <a:r>
               <a:rPr lang="hu-HU" dirty="0" err="1"/>
@@ -50003,15 +49905,7 @@
             </a:r>
             <a:r>
               <a:rPr lang="hu-HU" dirty="0"/>
-              <a:t>társtulajdonos a Boci IT kft-</a:t>
-            </a:r>
-            <a:r>
-              <a:rPr lang="hu-HU" dirty="0"/>
-              <a:t>ben</a:t>
-            </a:r>
-            <a:r>
-              <a:rPr lang="hu-HU" dirty="0"/>
-              <a:t>.</a:t>
+              <a:t>társtulajdonos a Boci IT kft-ben.</a:t>
             </a:r>
           </a:p>
           <a:p>
@@ -50518,115 +50412,6 @@
     <p:extLst>
       <p:ext uri="{BB962C8B-B14F-4D97-AF65-F5344CB8AC3E}">
         <p14:creationId xmlns:p14="http://schemas.microsoft.com/office/powerpoint/2010/main" val="2695672276"/>
-      </p:ext>
-    </p:extLst>
-  </p:cSld>
-  <p:clrMapOvr>
-    <a:masterClrMapping/>
-  </p:clrMapOvr>
-  <p:timing>
-    <p:tnLst>
-      <p:par>
-        <p:cTn id="1" dur="indefinite" restart="never" nodeType="tmRoot"/>
-      </p:par>
-    </p:tnLst>
-  </p:timing>
-</p:sld>
-</file>
-
-<file path=ppt/slides/slide17.xml><?xml version="1.0" encoding="utf-8"?>
-<p:sld xmlns:a="http://schemas.openxmlformats.org/drawingml/2006/main" xmlns:r="http://schemas.openxmlformats.org/officeDocument/2006/relationships" xmlns:p="http://schemas.openxmlformats.org/presentationml/2006/main">
-  <p:cSld>
-    <p:spTree>
-      <p:nvGrpSpPr>
-        <p:cNvPr id="1" name=""/>
-        <p:cNvGrpSpPr/>
-        <p:nvPr/>
-      </p:nvGrpSpPr>
-      <p:grpSpPr>
-        <a:xfrm>
-          <a:off x="0" y="0"/>
-          <a:ext cx="0" cy="0"/>
-          <a:chOff x="0" y="0"/>
-          <a:chExt cx="0" cy="0"/>
-        </a:xfrm>
-      </p:grpSpPr>
-      <p:sp>
-        <p:nvSpPr>
-          <p:cNvPr id="4" name="Cím 3">
-            <a:extLst>
-              <a:ext uri="{FF2B5EF4-FFF2-40B4-BE49-F238E27FC236}">
-                <a16:creationId xmlns:a16="http://schemas.microsoft.com/office/drawing/2014/main" id="{E98DCA46-603B-4178-8707-30E192CE6B8D}"/>
-              </a:ext>
-            </a:extLst>
-          </p:cNvPr>
-          <p:cNvSpPr>
-            <a:spLocks noGrp="1"/>
-          </p:cNvSpPr>
-          <p:nvPr>
-            <p:ph type="title"/>
-          </p:nvPr>
-        </p:nvSpPr>
-        <p:spPr/>
-        <p:txBody>
-          <a:bodyPr rtlCol="0"/>
-          <a:lstStyle/>
-          <a:p>
-            <a:pPr rtl="0"/>
-            <a:r>
-              <a:rPr lang="hu-HU" dirty="0" smtClean="0"/>
-              <a:t>A sablon </a:t>
-            </a:r>
-            <a:r>
-              <a:rPr lang="hu-HU" dirty="0" err="1" smtClean="0"/>
-              <a:t>testreszabása</a:t>
-            </a:r>
-            <a:endParaRPr lang="hu-HU" dirty="0"/>
-          </a:p>
-        </p:txBody>
-      </p:sp>
-      <p:sp>
-        <p:nvSpPr>
-          <p:cNvPr id="8" name="Szövegdoboz 7">
-            <a:hlinkClick r:id="rId3"/>
-            <a:extLst>
-              <a:ext uri="{FF2B5EF4-FFF2-40B4-BE49-F238E27FC236}">
-                <a16:creationId xmlns:a16="http://schemas.microsoft.com/office/drawing/2014/main" id="{5FC6C278-4035-446A-A94B-030E792FDDF5}"/>
-              </a:ext>
-            </a:extLst>
-          </p:cNvPr>
-          <p:cNvSpPr txBox="1"/>
-          <p:nvPr/>
-        </p:nvSpPr>
-        <p:spPr>
-          <a:xfrm>
-            <a:off x="1547813" y="2459504"/>
-            <a:ext cx="9096374" cy="1938992"/>
-          </a:xfrm>
-          <a:prstGeom prst="rect">
-            <a:avLst/>
-          </a:prstGeom>
-          <a:noFill/>
-        </p:spPr>
-        <p:txBody>
-          <a:bodyPr wrap="square" rtlCol="0">
-            <a:spAutoFit/>
-          </a:bodyPr>
-          <a:lstStyle/>
-          <a:p>
-            <a:pPr algn="ctr" rtl="0"/>
-            <a:r>
-              <a:rPr lang="hu-HU" sz="6000" b="1" u="sng" dirty="0" smtClean="0"/>
-              <a:t>Sablonszerkesztési utasítások és visszajelzés</a:t>
-            </a:r>
-            <a:endParaRPr lang="hu-HU" sz="6000" b="1" u="sng" dirty="0"/>
-          </a:p>
-        </p:txBody>
-      </p:sp>
-    </p:spTree>
-    <p:extLst>
-      <p:ext uri="{BB962C8B-B14F-4D97-AF65-F5344CB8AC3E}">
-        <p14:creationId xmlns:p14="http://schemas.microsoft.com/office/powerpoint/2010/main" val="59582380"/>
       </p:ext>
     </p:extLst>
   </p:cSld>
@@ -51784,7 +51569,7 @@
                 <a14:useLocalDpi xmlns:a14="http://schemas.microsoft.com/office/drawing/2010/main" val="0"/>
               </a:ext>
               <a:ext uri="{96DAC541-7B7A-43D3-8B79-37D633B846F1}">
-                <asvg:svgBlip xmlns:asvg="http://schemas.microsoft.com/office/drawing/2016/SVG/main" xmlns="" r:embed="rId4"/>
+                <asvg:svgBlip xmlns="" xmlns:asvg="http://schemas.microsoft.com/office/drawing/2016/SVG/main" r:embed="rId4"/>
               </a:ext>
             </a:extLst>
           </a:blip>
@@ -52336,7 +52121,7 @@
                 <a14:useLocalDpi xmlns:a14="http://schemas.microsoft.com/office/drawing/2010/main" val="0"/>
               </a:ext>
               <a:ext uri="{96DAC541-7B7A-43D3-8B79-37D633B846F1}">
-                <asvg:svgBlip xmlns:asvg="http://schemas.microsoft.com/office/drawing/2016/SVG/main" xmlns="" r:embed="rId4"/>
+                <asvg:svgBlip xmlns="" xmlns:asvg="http://schemas.microsoft.com/office/drawing/2016/SVG/main" r:embed="rId4"/>
               </a:ext>
             </a:extLst>
           </a:blip>
@@ -52888,7 +52673,7 @@
                 <a14:useLocalDpi xmlns:a14="http://schemas.microsoft.com/office/drawing/2010/main" val="0"/>
               </a:ext>
               <a:ext uri="{96DAC541-7B7A-43D3-8B79-37D633B846F1}">
-                <asvg:svgBlip xmlns:asvg="http://schemas.microsoft.com/office/drawing/2016/SVG/main" xmlns="" r:embed="rId4"/>
+                <asvg:svgBlip xmlns="" xmlns:asvg="http://schemas.microsoft.com/office/drawing/2016/SVG/main" r:embed="rId4"/>
               </a:ext>
             </a:extLst>
           </a:blip>
@@ -53141,7 +52926,7 @@
                 <a14:useLocalDpi xmlns:a14="http://schemas.microsoft.com/office/drawing/2010/main" val="0"/>
               </a:ext>
               <a:ext uri="{96DAC541-7B7A-43D3-8B79-37D633B846F1}">
-                <asvg:svgBlip xmlns:asvg="http://schemas.microsoft.com/office/drawing/2016/SVG/main" xmlns="" r:embed="rId4"/>
+                <asvg:svgBlip xmlns="" xmlns:asvg="http://schemas.microsoft.com/office/drawing/2016/SVG/main" r:embed="rId4"/>
               </a:ext>
             </a:extLst>
           </a:blip>
@@ -54251,7 +54036,7 @@
                 <a14:useLocalDpi xmlns:a14="http://schemas.microsoft.com/office/drawing/2010/main" val="0"/>
               </a:ext>
               <a:ext uri="{96DAC541-7B7A-43D3-8B79-37D633B846F1}">
-                <asvg:svgBlip xmlns:asvg="http://schemas.microsoft.com/office/drawing/2016/SVG/main" xmlns="" r:embed="rId4"/>
+                <asvg:svgBlip xmlns="" xmlns:asvg="http://schemas.microsoft.com/office/drawing/2016/SVG/main" r:embed="rId4"/>
               </a:ext>
             </a:extLst>
           </a:blip>

</xml_diff>

<commit_message>
PPT képek és logo beillesztés
</commit_message>
<xml_diff>
--- a/documentation/PPT/TerFelSzoft.pptx
+++ b/documentation/PPT/TerFelSzoft.pptx
@@ -16,8 +16,8 @@
     <p:sldId id="258" r:id="rId4"/>
     <p:sldId id="259" r:id="rId5"/>
     <p:sldId id="265" r:id="rId6"/>
-    <p:sldId id="283" r:id="rId7"/>
-    <p:sldId id="262" r:id="rId8"/>
+    <p:sldId id="262" r:id="rId7"/>
+    <p:sldId id="283" r:id="rId8"/>
     <p:sldId id="263" r:id="rId9"/>
     <p:sldId id="269" r:id="rId10"/>
     <p:sldId id="274" r:id="rId11"/>
@@ -2628,7 +2628,7 @@
     </p:spTree>
     <p:extLst>
       <p:ext uri="{BB962C8B-B14F-4D97-AF65-F5344CB8AC3E}">
-        <p14:creationId xmlns:p14="http://schemas.microsoft.com/office/powerpoint/2010/main" val="1758616836"/>
+        <p14:creationId xmlns:p14="http://schemas.microsoft.com/office/powerpoint/2010/main" val="2285217782"/>
       </p:ext>
     </p:extLst>
   </p:cSld>
@@ -2714,7 +2714,7 @@
     </p:spTree>
     <p:extLst>
       <p:ext uri="{BB962C8B-B14F-4D97-AF65-F5344CB8AC3E}">
-        <p14:creationId xmlns:p14="http://schemas.microsoft.com/office/powerpoint/2010/main" val="2285217782"/>
+        <p14:creationId xmlns:p14="http://schemas.microsoft.com/office/powerpoint/2010/main" val="1758616836"/>
       </p:ext>
     </p:extLst>
   </p:cSld>
@@ -31638,7 +31638,7 @@
             <a:blip r:embed="rId2">
               <a:extLst>
                 <a:ext uri="{96DAC541-7B7A-43D3-8B79-37D633B846F1}">
-                  <asvg:svgBlip xmlns="" xmlns:asvg="http://schemas.microsoft.com/office/drawing/2016/SVG/main" r:embed="rId3"/>
+                  <asvg:svgBlip xmlns:asvg="http://schemas.microsoft.com/office/drawing/2016/SVG/main" xmlns="" r:embed="rId3"/>
                 </a:ext>
               </a:extLst>
             </a:blip>
@@ -42175,7 +42175,7 @@
             <a:blip r:embed="rId2">
               <a:extLst>
                 <a:ext uri="{96DAC541-7B7A-43D3-8B79-37D633B846F1}">
-                  <asvg:svgBlip xmlns="" xmlns:asvg="http://schemas.microsoft.com/office/drawing/2016/SVG/main" r:embed="rId3"/>
+                  <asvg:svgBlip xmlns:asvg="http://schemas.microsoft.com/office/drawing/2016/SVG/main" xmlns="" r:embed="rId3"/>
                 </a:ext>
               </a:extLst>
             </a:blip>
@@ -46401,7 +46401,7 @@
       </p:grpSpPr>
       <p:pic>
         <p:nvPicPr>
-          <p:cNvPr id="27" name="Kép helyőrzője 26" descr="Céges embléma">
+          <p:cNvPr id="27" name="Kép helyőrzője 26">
             <a:extLst>
               <a:ext uri="{FF2B5EF4-FFF2-40B4-BE49-F238E27FC236}">
                 <a16:creationId xmlns:a16="http://schemas.microsoft.com/office/drawing/2014/main" id="{FB2A302B-5D3B-40EC-8BE1-BD296E9D1B98}"/>
@@ -46421,8 +46421,100 @@
               <a:ext uri="{28A0092B-C50C-407E-A947-70E740481C1C}">
                 <a14:useLocalDpi xmlns:a14="http://schemas.microsoft.com/office/drawing/2010/main" val="0"/>
               </a:ext>
-              <a:ext uri="{96DAC541-7B7A-43D3-8B79-37D633B846F1}">
-                <asvg:svgBlip xmlns="" xmlns:asvg="http://schemas.microsoft.com/office/drawing/2016/SVG/main" r:embed="rId4"/>
+            </a:extLst>
+          </a:blip>
+          <a:stretch>
+            <a:fillRect/>
+          </a:stretch>
+        </p:blipFill>
+        <p:spPr>
+          <a:xfrm>
+            <a:off x="0" y="0"/>
+            <a:ext cx="1328400" cy="1328400"/>
+          </a:xfrm>
+        </p:spPr>
+      </p:pic>
+      <p:sp>
+        <p:nvSpPr>
+          <p:cNvPr id="5" name="Cím 4">
+            <a:extLst>
+              <a:ext uri="{FF2B5EF4-FFF2-40B4-BE49-F238E27FC236}">
+                <a16:creationId xmlns:a16="http://schemas.microsoft.com/office/drawing/2014/main" id="{EC73CEBD-6C08-4E0C-9E82-28D34A80CBB8}"/>
+              </a:ext>
+            </a:extLst>
+          </p:cNvPr>
+          <p:cNvSpPr>
+            <a:spLocks noGrp="1"/>
+          </p:cNvSpPr>
+          <p:nvPr>
+            <p:ph type="title"/>
+          </p:nvPr>
+        </p:nvSpPr>
+        <p:spPr/>
+        <p:txBody>
+          <a:bodyPr rtlCol="0"/>
+          <a:lstStyle/>
+          <a:p>
+            <a:pPr rtl="0"/>
+            <a:r>
+              <a:rPr lang="hu-HU" dirty="0" smtClean="0"/>
+              <a:t>Csapatdia</a:t>
+            </a:r>
+            <a:endParaRPr lang="hu-HU" dirty="0"/>
+          </a:p>
+        </p:txBody>
+      </p:sp>
+      <p:sp>
+        <p:nvSpPr>
+          <p:cNvPr id="6" name="Szöveg helye 5">
+            <a:extLst>
+              <a:ext uri="{FF2B5EF4-FFF2-40B4-BE49-F238E27FC236}">
+                <a16:creationId xmlns:a16="http://schemas.microsoft.com/office/drawing/2014/main" id="{729B071F-0D12-4804-81BF-4FFB907A216A}"/>
+              </a:ext>
+            </a:extLst>
+          </p:cNvPr>
+          <p:cNvSpPr>
+            <a:spLocks noGrp="1"/>
+          </p:cNvSpPr>
+          <p:nvPr>
+            <p:ph type="body" idx="1"/>
+          </p:nvPr>
+        </p:nvSpPr>
+        <p:spPr/>
+        <p:txBody>
+          <a:bodyPr rtlCol="0"/>
+          <a:lstStyle/>
+          <a:p>
+            <a:pPr rtl="0"/>
+            <a:r>
+              <a:rPr lang="hu-HU" dirty="0" smtClean="0"/>
+              <a:t>LOREM IPSUM DOLOR SIT AMET, CONSECTETUER ADIPISCING ELIT. MAECENAS PORTTITOR</a:t>
+            </a:r>
+            <a:endParaRPr lang="hu-HU" dirty="0"/>
+          </a:p>
+        </p:txBody>
+      </p:sp>
+      <p:pic>
+        <p:nvPicPr>
+          <p:cNvPr id="29" name="Kép helyőrzője 28" descr="Csapattag fényképe">
+            <a:extLst>
+              <a:ext uri="{FF2B5EF4-FFF2-40B4-BE49-F238E27FC236}">
+                <a16:creationId xmlns:a16="http://schemas.microsoft.com/office/drawing/2014/main" id="{A708FADF-CDF9-4068-A8FE-942FF9B74D1A}"/>
+              </a:ext>
+            </a:extLst>
+          </p:cNvPr>
+          <p:cNvPicPr>
+            <a:picLocks noGrp="1" noChangeAspect="1"/>
+          </p:cNvPicPr>
+          <p:nvPr>
+            <p:ph type="pic" sz="quarter" idx="33"/>
+          </p:nvPr>
+        </p:nvPicPr>
+        <p:blipFill>
+          <a:blip r:embed="rId4">
+            <a:extLst>
+              <a:ext uri="{28A0092B-C50C-407E-A947-70E740481C1C}">
+                <a14:useLocalDpi xmlns:a14="http://schemas.microsoft.com/office/drawing/2010/main" val="0"/>
               </a:ext>
             </a:extLst>
           </a:blip>
@@ -46435,10 +46527,10 @@
       </p:pic>
       <p:sp>
         <p:nvSpPr>
-          <p:cNvPr id="5" name="Cím 4">
-            <a:extLst>
-              <a:ext uri="{FF2B5EF4-FFF2-40B4-BE49-F238E27FC236}">
-                <a16:creationId xmlns:a16="http://schemas.microsoft.com/office/drawing/2014/main" id="{EC73CEBD-6C08-4E0C-9E82-28D34A80CBB8}"/>
+          <p:cNvPr id="9" name="Szöveg helye 8">
+            <a:extLst>
+              <a:ext uri="{FF2B5EF4-FFF2-40B4-BE49-F238E27FC236}">
+                <a16:creationId xmlns:a16="http://schemas.microsoft.com/office/drawing/2014/main" id="{E8E00B54-1018-41A0-92AF-46D993630EBD}"/>
               </a:ext>
             </a:extLst>
           </p:cNvPr>
@@ -46446,7 +46538,47 @@
             <a:spLocks noGrp="1"/>
           </p:cNvSpPr>
           <p:nvPr>
-            <p:ph type="title"/>
+            <p:ph type="body" idx="16"/>
+          </p:nvPr>
+        </p:nvSpPr>
+        <p:spPr/>
+        <p:txBody>
+          <a:bodyPr rtlCol="0">
+            <a:normAutofit/>
+          </a:bodyPr>
+          <a:lstStyle/>
+          <a:p>
+            <a:pPr rtl="0"/>
+            <a:r>
+              <a:rPr lang="hu-HU" dirty="0" err="1" smtClean="0"/>
+              <a:t>Angelica</a:t>
+            </a:r>
+            <a:r>
+              <a:rPr lang="hu-HU" dirty="0" smtClean="0"/>
+              <a:t> </a:t>
+            </a:r>
+            <a:r>
+              <a:rPr lang="hu-HU" dirty="0" err="1" smtClean="0"/>
+              <a:t>Astrom</a:t>
+            </a:r>
+            <a:endParaRPr lang="hu-HU" dirty="0"/>
+          </a:p>
+        </p:txBody>
+      </p:sp>
+      <p:sp>
+        <p:nvSpPr>
+          <p:cNvPr id="8" name="Szöveg helye 7">
+            <a:extLst>
+              <a:ext uri="{FF2B5EF4-FFF2-40B4-BE49-F238E27FC236}">
+                <a16:creationId xmlns:a16="http://schemas.microsoft.com/office/drawing/2014/main" id="{8B8E9E7A-1401-4E48-8C01-EA96A17BDF2A}"/>
+              </a:ext>
+            </a:extLst>
+          </p:cNvPr>
+          <p:cNvSpPr>
+            <a:spLocks noGrp="1"/>
+          </p:cNvSpPr>
+          <p:nvPr>
+            <p:ph type="body" idx="14"/>
           </p:nvPr>
         </p:nvSpPr>
         <p:spPr/>
@@ -46457,37 +46589,7 @@
             <a:pPr rtl="0"/>
             <a:r>
               <a:rPr lang="hu-HU" dirty="0" smtClean="0"/>
-              <a:t>Csapatdia</a:t>
-            </a:r>
-            <a:endParaRPr lang="hu-HU" dirty="0"/>
-          </a:p>
-        </p:txBody>
-      </p:sp>
-      <p:sp>
-        <p:nvSpPr>
-          <p:cNvPr id="6" name="Szöveg helye 5">
-            <a:extLst>
-              <a:ext uri="{FF2B5EF4-FFF2-40B4-BE49-F238E27FC236}">
-                <a16:creationId xmlns:a16="http://schemas.microsoft.com/office/drawing/2014/main" id="{729B071F-0D12-4804-81BF-4FFB907A216A}"/>
-              </a:ext>
-            </a:extLst>
-          </p:cNvPr>
-          <p:cNvSpPr>
-            <a:spLocks noGrp="1"/>
-          </p:cNvSpPr>
-          <p:nvPr>
-            <p:ph type="body" idx="1"/>
-          </p:nvPr>
-        </p:nvSpPr>
-        <p:spPr/>
-        <p:txBody>
-          <a:bodyPr rtlCol="0"/>
-          <a:lstStyle/>
-          <a:p>
-            <a:pPr rtl="0"/>
-            <a:r>
-              <a:rPr lang="hu-HU" dirty="0" smtClean="0"/>
-              <a:t>LOREM IPSUM DOLOR SIT AMET, CONSECTETUER ADIPISCING ELIT. MAECENAS PORTTITOR</a:t>
+              <a:t>Csapattag beosztása</a:t>
             </a:r>
             <a:endParaRPr lang="hu-HU" dirty="0"/>
           </a:p>
@@ -46495,10 +46597,10 @@
       </p:sp>
       <p:pic>
         <p:nvPicPr>
-          <p:cNvPr id="29" name="Kép helyőrzője 28" descr="Csapattag fényképe">
-            <a:extLst>
-              <a:ext uri="{FF2B5EF4-FFF2-40B4-BE49-F238E27FC236}">
-                <a16:creationId xmlns:a16="http://schemas.microsoft.com/office/drawing/2014/main" id="{A708FADF-CDF9-4068-A8FE-942FF9B74D1A}"/>
+          <p:cNvPr id="33" name="Kép helyőrzője 32" descr="Csapattag fényképe">
+            <a:extLst>
+              <a:ext uri="{FF2B5EF4-FFF2-40B4-BE49-F238E27FC236}">
+                <a16:creationId xmlns:a16="http://schemas.microsoft.com/office/drawing/2014/main" id="{F95B48C7-C603-448B-812B-C71705CF1B75}"/>
               </a:ext>
             </a:extLst>
           </p:cNvPr>
@@ -46506,7 +46608,7 @@
             <a:picLocks noGrp="1" noChangeAspect="1"/>
           </p:cNvPicPr>
           <p:nvPr>
-            <p:ph type="pic" sz="quarter" idx="33"/>
+            <p:ph type="pic" sz="quarter" idx="39"/>
           </p:nvPr>
         </p:nvPicPr>
         <p:blipFill>
@@ -46526,10 +46628,10 @@
       </p:pic>
       <p:sp>
         <p:nvSpPr>
-          <p:cNvPr id="9" name="Szöveg helye 8">
-            <a:extLst>
-              <a:ext uri="{FF2B5EF4-FFF2-40B4-BE49-F238E27FC236}">
-                <a16:creationId xmlns:a16="http://schemas.microsoft.com/office/drawing/2014/main" id="{E8E00B54-1018-41A0-92AF-46D993630EBD}"/>
+          <p:cNvPr id="15" name="Szöveg helye 14">
+            <a:extLst>
+              <a:ext uri="{FF2B5EF4-FFF2-40B4-BE49-F238E27FC236}">
+                <a16:creationId xmlns:a16="http://schemas.microsoft.com/office/drawing/2014/main" id="{EA6A43FA-5FFA-484D-8D0E-4C7A54F256A7}"/>
               </a:ext>
             </a:extLst>
           </p:cNvPr>
@@ -46537,7 +46639,7 @@
             <a:spLocks noGrp="1"/>
           </p:cNvSpPr>
           <p:nvPr>
-            <p:ph type="body" idx="16"/>
+            <p:ph type="body" idx="38"/>
           </p:nvPr>
         </p:nvSpPr>
         <p:spPr/>
@@ -46550,7 +46652,7 @@
             <a:pPr rtl="0"/>
             <a:r>
               <a:rPr lang="hu-HU" dirty="0" err="1" smtClean="0"/>
-              <a:t>Angelica</a:t>
+              <a:t>Ian</a:t>
             </a:r>
             <a:r>
               <a:rPr lang="hu-HU" dirty="0" smtClean="0"/>
@@ -46558,7 +46660,7 @@
             </a:r>
             <a:r>
               <a:rPr lang="hu-HU" dirty="0" err="1" smtClean="0"/>
-              <a:t>Astrom</a:t>
+              <a:t>Hansson</a:t>
             </a:r>
             <a:endParaRPr lang="hu-HU" dirty="0"/>
           </a:p>
@@ -46566,10 +46668,10 @@
       </p:sp>
       <p:sp>
         <p:nvSpPr>
-          <p:cNvPr id="8" name="Szöveg helye 7">
-            <a:extLst>
-              <a:ext uri="{FF2B5EF4-FFF2-40B4-BE49-F238E27FC236}">
-                <a16:creationId xmlns:a16="http://schemas.microsoft.com/office/drawing/2014/main" id="{8B8E9E7A-1401-4E48-8C01-EA96A17BDF2A}"/>
+          <p:cNvPr id="14" name="Szöveg helye 13">
+            <a:extLst>
+              <a:ext uri="{FF2B5EF4-FFF2-40B4-BE49-F238E27FC236}">
+                <a16:creationId xmlns:a16="http://schemas.microsoft.com/office/drawing/2014/main" id="{35DC5F9B-BC45-47B1-9569-03F24C5366F9}"/>
               </a:ext>
             </a:extLst>
           </p:cNvPr>
@@ -46577,7 +46679,7 @@
             <a:spLocks noGrp="1"/>
           </p:cNvSpPr>
           <p:nvPr>
-            <p:ph type="body" idx="14"/>
+            <p:ph type="body" idx="37"/>
           </p:nvPr>
         </p:nvSpPr>
         <p:spPr/>
@@ -46596,10 +46698,10 @@
       </p:sp>
       <p:pic>
         <p:nvPicPr>
-          <p:cNvPr id="33" name="Kép helyőrzője 32" descr="Csapattag fényképe">
-            <a:extLst>
-              <a:ext uri="{FF2B5EF4-FFF2-40B4-BE49-F238E27FC236}">
-                <a16:creationId xmlns:a16="http://schemas.microsoft.com/office/drawing/2014/main" id="{F95B48C7-C603-448B-812B-C71705CF1B75}"/>
+          <p:cNvPr id="37" name="Kép helyőrzője 36" descr="Csapattag fényképe">
+            <a:extLst>
+              <a:ext uri="{FF2B5EF4-FFF2-40B4-BE49-F238E27FC236}">
+                <a16:creationId xmlns:a16="http://schemas.microsoft.com/office/drawing/2014/main" id="{F1002F14-48E2-4C6C-8D4B-E53C0E3ACF27}"/>
               </a:ext>
             </a:extLst>
           </p:cNvPr>
@@ -46607,7 +46709,7 @@
             <a:picLocks noGrp="1" noChangeAspect="1"/>
           </p:cNvPicPr>
           <p:nvPr>
-            <p:ph type="pic" sz="quarter" idx="39"/>
+            <p:ph type="pic" sz="quarter" idx="45"/>
           </p:nvPr>
         </p:nvPicPr>
         <p:blipFill>
@@ -46627,10 +46729,10 @@
       </p:pic>
       <p:sp>
         <p:nvSpPr>
-          <p:cNvPr id="15" name="Szöveg helye 14">
-            <a:extLst>
-              <a:ext uri="{FF2B5EF4-FFF2-40B4-BE49-F238E27FC236}">
-                <a16:creationId xmlns:a16="http://schemas.microsoft.com/office/drawing/2014/main" id="{EA6A43FA-5FFA-484D-8D0E-4C7A54F256A7}"/>
+          <p:cNvPr id="21" name="Szöveg helye 20">
+            <a:extLst>
+              <a:ext uri="{FF2B5EF4-FFF2-40B4-BE49-F238E27FC236}">
+                <a16:creationId xmlns:a16="http://schemas.microsoft.com/office/drawing/2014/main" id="{147D9385-B136-49E1-B50C-69B506A798B8}"/>
               </a:ext>
             </a:extLst>
           </p:cNvPr>
@@ -46638,7 +46740,7 @@
             <a:spLocks noGrp="1"/>
           </p:cNvSpPr>
           <p:nvPr>
-            <p:ph type="body" idx="38"/>
+            <p:ph type="body" idx="44"/>
           </p:nvPr>
         </p:nvSpPr>
         <p:spPr/>
@@ -46651,7 +46753,7 @@
             <a:pPr rtl="0"/>
             <a:r>
               <a:rPr lang="hu-HU" dirty="0" err="1" smtClean="0"/>
-              <a:t>Ian</a:t>
+              <a:t>Jens</a:t>
             </a:r>
             <a:r>
               <a:rPr lang="hu-HU" dirty="0" smtClean="0"/>
@@ -46659,7 +46761,7 @@
             </a:r>
             <a:r>
               <a:rPr lang="hu-HU" dirty="0" err="1" smtClean="0"/>
-              <a:t>Hansson</a:t>
+              <a:t>Martensson</a:t>
             </a:r>
             <a:endParaRPr lang="hu-HU" dirty="0"/>
           </a:p>
@@ -46667,10 +46769,10 @@
       </p:sp>
       <p:sp>
         <p:nvSpPr>
-          <p:cNvPr id="14" name="Szöveg helye 13">
-            <a:extLst>
-              <a:ext uri="{FF2B5EF4-FFF2-40B4-BE49-F238E27FC236}">
-                <a16:creationId xmlns:a16="http://schemas.microsoft.com/office/drawing/2014/main" id="{35DC5F9B-BC45-47B1-9569-03F24C5366F9}"/>
+          <p:cNvPr id="20" name="Szöveg helye 19">
+            <a:extLst>
+              <a:ext uri="{FF2B5EF4-FFF2-40B4-BE49-F238E27FC236}">
+                <a16:creationId xmlns:a16="http://schemas.microsoft.com/office/drawing/2014/main" id="{41A02D9C-967F-448E-86B7-F059F13F3C49}"/>
               </a:ext>
             </a:extLst>
           </p:cNvPr>
@@ -46678,7 +46780,7 @@
             <a:spLocks noGrp="1"/>
           </p:cNvSpPr>
           <p:nvPr>
-            <p:ph type="body" idx="37"/>
+            <p:ph type="body" idx="43"/>
           </p:nvPr>
         </p:nvSpPr>
         <p:spPr/>
@@ -46697,10 +46799,10 @@
       </p:sp>
       <p:pic>
         <p:nvPicPr>
-          <p:cNvPr id="37" name="Kép helyőrzője 36" descr="Csapattag fényképe">
-            <a:extLst>
-              <a:ext uri="{FF2B5EF4-FFF2-40B4-BE49-F238E27FC236}">
-                <a16:creationId xmlns:a16="http://schemas.microsoft.com/office/drawing/2014/main" id="{F1002F14-48E2-4C6C-8D4B-E53C0E3ACF27}"/>
+          <p:cNvPr id="31" name="Kép helyőrzője 30" descr="Csapattag fényképe">
+            <a:extLst>
+              <a:ext uri="{FF2B5EF4-FFF2-40B4-BE49-F238E27FC236}">
+                <a16:creationId xmlns:a16="http://schemas.microsoft.com/office/drawing/2014/main" id="{D5DA1A83-8A79-4EA5-9999-C608FC485F96}"/>
               </a:ext>
             </a:extLst>
           </p:cNvPr>
@@ -46708,11 +46810,11 @@
             <a:picLocks noGrp="1" noChangeAspect="1"/>
           </p:cNvPicPr>
           <p:nvPr>
-            <p:ph type="pic" sz="quarter" idx="45"/>
+            <p:ph type="pic" sz="quarter" idx="36"/>
           </p:nvPr>
         </p:nvPicPr>
         <p:blipFill>
-          <a:blip r:embed="rId7">
+          <a:blip r:embed="rId4">
             <a:extLst>
               <a:ext uri="{28A0092B-C50C-407E-A947-70E740481C1C}">
                 <a14:useLocalDpi xmlns:a14="http://schemas.microsoft.com/office/drawing/2010/main" val="0"/>
@@ -46728,10 +46830,10 @@
       </p:pic>
       <p:sp>
         <p:nvSpPr>
-          <p:cNvPr id="21" name="Szöveg helye 20">
-            <a:extLst>
-              <a:ext uri="{FF2B5EF4-FFF2-40B4-BE49-F238E27FC236}">
-                <a16:creationId xmlns:a16="http://schemas.microsoft.com/office/drawing/2014/main" id="{147D9385-B136-49E1-B50C-69B506A798B8}"/>
+          <p:cNvPr id="12" name="Szöveg helye 11">
+            <a:extLst>
+              <a:ext uri="{FF2B5EF4-FFF2-40B4-BE49-F238E27FC236}">
+                <a16:creationId xmlns:a16="http://schemas.microsoft.com/office/drawing/2014/main" id="{B11CC907-EFCA-4CEC-AC44-3398B08E17B6}"/>
               </a:ext>
             </a:extLst>
           </p:cNvPr>
@@ -46739,20 +46841,18 @@
             <a:spLocks noGrp="1"/>
           </p:cNvSpPr>
           <p:nvPr>
-            <p:ph type="body" idx="44"/>
+            <p:ph type="body" idx="35"/>
           </p:nvPr>
         </p:nvSpPr>
         <p:spPr/>
         <p:txBody>
-          <a:bodyPr rtlCol="0">
-            <a:normAutofit/>
-          </a:bodyPr>
+          <a:bodyPr rtlCol="0"/>
           <a:lstStyle/>
           <a:p>
             <a:pPr rtl="0"/>
             <a:r>
               <a:rPr lang="hu-HU" dirty="0" err="1" smtClean="0"/>
-              <a:t>Jens</a:t>
+              <a:t>Angelica</a:t>
             </a:r>
             <a:r>
               <a:rPr lang="hu-HU" dirty="0" smtClean="0"/>
@@ -46760,7 +46860,7 @@
             </a:r>
             <a:r>
               <a:rPr lang="hu-HU" dirty="0" err="1" smtClean="0"/>
-              <a:t>Martensson</a:t>
+              <a:t>Astrom</a:t>
             </a:r>
             <a:endParaRPr lang="hu-HU" dirty="0"/>
           </a:p>
@@ -46768,10 +46868,10 @@
       </p:sp>
       <p:sp>
         <p:nvSpPr>
-          <p:cNvPr id="20" name="Szöveg helye 19">
-            <a:extLst>
-              <a:ext uri="{FF2B5EF4-FFF2-40B4-BE49-F238E27FC236}">
-                <a16:creationId xmlns:a16="http://schemas.microsoft.com/office/drawing/2014/main" id="{41A02D9C-967F-448E-86B7-F059F13F3C49}"/>
+          <p:cNvPr id="11" name="Szöveg helye 10">
+            <a:extLst>
+              <a:ext uri="{FF2B5EF4-FFF2-40B4-BE49-F238E27FC236}">
+                <a16:creationId xmlns:a16="http://schemas.microsoft.com/office/drawing/2014/main" id="{4B8E0463-D6FB-4AF0-B713-3509AC7FCDF3}"/>
               </a:ext>
             </a:extLst>
           </p:cNvPr>
@@ -46779,7 +46879,7 @@
             <a:spLocks noGrp="1"/>
           </p:cNvSpPr>
           <p:nvPr>
-            <p:ph type="body" idx="43"/>
+            <p:ph type="body" idx="34"/>
           </p:nvPr>
         </p:nvSpPr>
         <p:spPr/>
@@ -46798,10 +46898,10 @@
       </p:sp>
       <p:pic>
         <p:nvPicPr>
-          <p:cNvPr id="31" name="Kép helyőrzője 30" descr="Csapattag fényképe">
-            <a:extLst>
-              <a:ext uri="{FF2B5EF4-FFF2-40B4-BE49-F238E27FC236}">
-                <a16:creationId xmlns:a16="http://schemas.microsoft.com/office/drawing/2014/main" id="{D5DA1A83-8A79-4EA5-9999-C608FC485F96}"/>
+          <p:cNvPr id="35" name="Kép helyőrzője 34" descr="Csapattag fényképe">
+            <a:extLst>
+              <a:ext uri="{FF2B5EF4-FFF2-40B4-BE49-F238E27FC236}">
+                <a16:creationId xmlns:a16="http://schemas.microsoft.com/office/drawing/2014/main" id="{15B06B14-F8EB-4DD3-935C-A919FA6B579E}"/>
               </a:ext>
             </a:extLst>
           </p:cNvPr>
@@ -46809,7 +46909,7 @@
             <a:picLocks noGrp="1" noChangeAspect="1"/>
           </p:cNvPicPr>
           <p:nvPr>
-            <p:ph type="pic" sz="quarter" idx="36"/>
+            <p:ph type="pic" sz="quarter" idx="42"/>
           </p:nvPr>
         </p:nvPicPr>
         <p:blipFill>
@@ -46829,10 +46929,10 @@
       </p:pic>
       <p:sp>
         <p:nvSpPr>
-          <p:cNvPr id="12" name="Szöveg helye 11">
-            <a:extLst>
-              <a:ext uri="{FF2B5EF4-FFF2-40B4-BE49-F238E27FC236}">
-                <a16:creationId xmlns:a16="http://schemas.microsoft.com/office/drawing/2014/main" id="{B11CC907-EFCA-4CEC-AC44-3398B08E17B6}"/>
+          <p:cNvPr id="18" name="Szöveg helye 17">
+            <a:extLst>
+              <a:ext uri="{FF2B5EF4-FFF2-40B4-BE49-F238E27FC236}">
+                <a16:creationId xmlns:a16="http://schemas.microsoft.com/office/drawing/2014/main" id="{69CBA094-5068-4A31-8608-0B82623441B0}"/>
               </a:ext>
             </a:extLst>
           </p:cNvPr>
@@ -46840,7 +46940,7 @@
             <a:spLocks noGrp="1"/>
           </p:cNvSpPr>
           <p:nvPr>
-            <p:ph type="body" idx="35"/>
+            <p:ph type="body" idx="41"/>
           </p:nvPr>
         </p:nvSpPr>
         <p:spPr/>
@@ -46851,7 +46951,7 @@
             <a:pPr rtl="0"/>
             <a:r>
               <a:rPr lang="hu-HU" dirty="0" err="1" smtClean="0"/>
-              <a:t>Angelica</a:t>
+              <a:t>Ian</a:t>
             </a:r>
             <a:r>
               <a:rPr lang="hu-HU" dirty="0" smtClean="0"/>
@@ -46859,7 +46959,7 @@
             </a:r>
             <a:r>
               <a:rPr lang="hu-HU" dirty="0" err="1" smtClean="0"/>
-              <a:t>Astrom</a:t>
+              <a:t>Hansson</a:t>
             </a:r>
             <a:endParaRPr lang="hu-HU" dirty="0"/>
           </a:p>
@@ -46867,10 +46967,10 @@
       </p:sp>
       <p:sp>
         <p:nvSpPr>
-          <p:cNvPr id="11" name="Szöveg helye 10">
-            <a:extLst>
-              <a:ext uri="{FF2B5EF4-FFF2-40B4-BE49-F238E27FC236}">
-                <a16:creationId xmlns:a16="http://schemas.microsoft.com/office/drawing/2014/main" id="{4B8E0463-D6FB-4AF0-B713-3509AC7FCDF3}"/>
+          <p:cNvPr id="17" name="Szöveg helye 16">
+            <a:extLst>
+              <a:ext uri="{FF2B5EF4-FFF2-40B4-BE49-F238E27FC236}">
+                <a16:creationId xmlns:a16="http://schemas.microsoft.com/office/drawing/2014/main" id="{D3FB2709-DCAC-409A-A8AC-512006324CA0}"/>
               </a:ext>
             </a:extLst>
           </p:cNvPr>
@@ -46878,7 +46978,7 @@
             <a:spLocks noGrp="1"/>
           </p:cNvSpPr>
           <p:nvPr>
-            <p:ph type="body" idx="34"/>
+            <p:ph type="body" idx="40"/>
           </p:nvPr>
         </p:nvSpPr>
         <p:spPr/>
@@ -46897,10 +46997,10 @@
       </p:sp>
       <p:pic>
         <p:nvPicPr>
-          <p:cNvPr id="35" name="Kép helyőrzője 34" descr="Csapattag fényképe">
-            <a:extLst>
-              <a:ext uri="{FF2B5EF4-FFF2-40B4-BE49-F238E27FC236}">
-                <a16:creationId xmlns:a16="http://schemas.microsoft.com/office/drawing/2014/main" id="{15B06B14-F8EB-4DD3-935C-A919FA6B579E}"/>
+          <p:cNvPr id="39" name="Kép helyőrzője 38" descr="Csapattag fényképe">
+            <a:extLst>
+              <a:ext uri="{FF2B5EF4-FFF2-40B4-BE49-F238E27FC236}">
+                <a16:creationId xmlns:a16="http://schemas.microsoft.com/office/drawing/2014/main" id="{17AC82E1-4FC1-4FDD-95AF-9A92CEFFC144}"/>
               </a:ext>
             </a:extLst>
           </p:cNvPr>
@@ -46908,110 +47008,11 @@
             <a:picLocks noGrp="1" noChangeAspect="1"/>
           </p:cNvPicPr>
           <p:nvPr>
-            <p:ph type="pic" sz="quarter" idx="42"/>
+            <p:ph type="pic" sz="quarter" idx="48"/>
           </p:nvPr>
         </p:nvPicPr>
         <p:blipFill>
           <a:blip r:embed="rId6">
-            <a:extLst>
-              <a:ext uri="{28A0092B-C50C-407E-A947-70E740481C1C}">
-                <a14:useLocalDpi xmlns:a14="http://schemas.microsoft.com/office/drawing/2010/main" val="0"/>
-              </a:ext>
-            </a:extLst>
-          </a:blip>
-          <a:srcRect/>
-          <a:stretch>
-            <a:fillRect/>
-          </a:stretch>
-        </p:blipFill>
-        <p:spPr/>
-      </p:pic>
-      <p:sp>
-        <p:nvSpPr>
-          <p:cNvPr id="18" name="Szöveg helye 17">
-            <a:extLst>
-              <a:ext uri="{FF2B5EF4-FFF2-40B4-BE49-F238E27FC236}">
-                <a16:creationId xmlns:a16="http://schemas.microsoft.com/office/drawing/2014/main" id="{69CBA094-5068-4A31-8608-0B82623441B0}"/>
-              </a:ext>
-            </a:extLst>
-          </p:cNvPr>
-          <p:cNvSpPr>
-            <a:spLocks noGrp="1"/>
-          </p:cNvSpPr>
-          <p:nvPr>
-            <p:ph type="body" idx="41"/>
-          </p:nvPr>
-        </p:nvSpPr>
-        <p:spPr/>
-        <p:txBody>
-          <a:bodyPr rtlCol="0"/>
-          <a:lstStyle/>
-          <a:p>
-            <a:pPr rtl="0"/>
-            <a:r>
-              <a:rPr lang="hu-HU" dirty="0" err="1" smtClean="0"/>
-              <a:t>Ian</a:t>
-            </a:r>
-            <a:r>
-              <a:rPr lang="hu-HU" dirty="0" smtClean="0"/>
-              <a:t> </a:t>
-            </a:r>
-            <a:r>
-              <a:rPr lang="hu-HU" dirty="0" err="1" smtClean="0"/>
-              <a:t>Hansson</a:t>
-            </a:r>
-            <a:endParaRPr lang="hu-HU" dirty="0"/>
-          </a:p>
-        </p:txBody>
-      </p:sp>
-      <p:sp>
-        <p:nvSpPr>
-          <p:cNvPr id="17" name="Szöveg helye 16">
-            <a:extLst>
-              <a:ext uri="{FF2B5EF4-FFF2-40B4-BE49-F238E27FC236}">
-                <a16:creationId xmlns:a16="http://schemas.microsoft.com/office/drawing/2014/main" id="{D3FB2709-DCAC-409A-A8AC-512006324CA0}"/>
-              </a:ext>
-            </a:extLst>
-          </p:cNvPr>
-          <p:cNvSpPr>
-            <a:spLocks noGrp="1"/>
-          </p:cNvSpPr>
-          <p:nvPr>
-            <p:ph type="body" idx="40"/>
-          </p:nvPr>
-        </p:nvSpPr>
-        <p:spPr/>
-        <p:txBody>
-          <a:bodyPr rtlCol="0"/>
-          <a:lstStyle/>
-          <a:p>
-            <a:pPr rtl="0"/>
-            <a:r>
-              <a:rPr lang="hu-HU" dirty="0" smtClean="0"/>
-              <a:t>Csapattag beosztása</a:t>
-            </a:r>
-            <a:endParaRPr lang="hu-HU" dirty="0"/>
-          </a:p>
-        </p:txBody>
-      </p:sp>
-      <p:pic>
-        <p:nvPicPr>
-          <p:cNvPr id="39" name="Kép helyőrzője 38" descr="Csapattag fényképe">
-            <a:extLst>
-              <a:ext uri="{FF2B5EF4-FFF2-40B4-BE49-F238E27FC236}">
-                <a16:creationId xmlns:a16="http://schemas.microsoft.com/office/drawing/2014/main" id="{17AC82E1-4FC1-4FDD-95AF-9A92CEFFC144}"/>
-              </a:ext>
-            </a:extLst>
-          </p:cNvPr>
-          <p:cNvPicPr>
-            <a:picLocks noGrp="1" noChangeAspect="1"/>
-          </p:cNvPicPr>
-          <p:nvPr>
-            <p:ph type="pic" sz="quarter" idx="48"/>
-          </p:nvPr>
-        </p:nvPicPr>
-        <p:blipFill>
-          <a:blip r:embed="rId7">
             <a:extLst>
               <a:ext uri="{28A0092B-C50C-407E-A947-70E740481C1C}">
                 <a14:useLocalDpi xmlns:a14="http://schemas.microsoft.com/office/drawing/2010/main" val="0"/>
@@ -47222,7 +47223,7 @@
       </p:grpSpPr>
       <p:pic>
         <p:nvPicPr>
-          <p:cNvPr id="21" name="Kép helyőrzője 20" descr="Céges embléma">
+          <p:cNvPr id="21" name="Kép helyőrzője 20">
             <a:extLst>
               <a:ext uri="{FF2B5EF4-FFF2-40B4-BE49-F238E27FC236}">
                 <a16:creationId xmlns:a16="http://schemas.microsoft.com/office/drawing/2014/main" id="{6CEE2AB6-77F9-42A9-87B8-B3F629E6B0A5}"/>
@@ -47242,17 +47243,18 @@
               <a:ext uri="{28A0092B-C50C-407E-A947-70E740481C1C}">
                 <a14:useLocalDpi xmlns:a14="http://schemas.microsoft.com/office/drawing/2010/main" val="0"/>
               </a:ext>
-              <a:ext uri="{96DAC541-7B7A-43D3-8B79-37D633B846F1}">
-                <asvg:svgBlip xmlns="" xmlns:asvg="http://schemas.microsoft.com/office/drawing/2016/SVG/main" r:embed="rId4"/>
-              </a:ext>
             </a:extLst>
           </a:blip>
-          <a:srcRect/>
           <a:stretch>
             <a:fillRect/>
           </a:stretch>
         </p:blipFill>
-        <p:spPr/>
+        <p:spPr>
+          <a:xfrm>
+            <a:off x="0" y="0"/>
+            <a:ext cx="1328400" cy="1328400"/>
+          </a:xfrm>
+        </p:spPr>
       </p:pic>
       <p:sp>
         <p:nvSpPr>
@@ -47713,7 +47715,7 @@
         </p:xfrm>
         <a:graphic>
           <a:graphicData uri="http://schemas.openxmlformats.org/drawingml/2006/chart">
-            <c:chart xmlns:c="http://schemas.openxmlformats.org/drawingml/2006/chart" xmlns:r="http://schemas.openxmlformats.org/officeDocument/2006/relationships" r:id="rId5"/>
+            <c:chart xmlns:c="http://schemas.openxmlformats.org/drawingml/2006/chart" xmlns:r="http://schemas.openxmlformats.org/officeDocument/2006/relationships" r:id="rId4"/>
           </a:graphicData>
         </a:graphic>
       </p:graphicFrame>
@@ -47846,7 +47848,7 @@
       </p:grpSpPr>
       <p:pic>
         <p:nvPicPr>
-          <p:cNvPr id="10" name="Kép helyőrzője 9" descr="Céges embléma">
+          <p:cNvPr id="10" name="Kép helyőrzője 9">
             <a:extLst>
               <a:ext uri="{FF2B5EF4-FFF2-40B4-BE49-F238E27FC236}">
                 <a16:creationId xmlns:a16="http://schemas.microsoft.com/office/drawing/2014/main" id="{CA87F037-7DB2-45C9-A176-874E6A13B3A8}"/>
@@ -47866,17 +47868,18 @@
               <a:ext uri="{28A0092B-C50C-407E-A947-70E740481C1C}">
                 <a14:useLocalDpi xmlns:a14="http://schemas.microsoft.com/office/drawing/2010/main" val="0"/>
               </a:ext>
-              <a:ext uri="{96DAC541-7B7A-43D3-8B79-37D633B846F1}">
-                <asvg:svgBlip xmlns="" xmlns:asvg="http://schemas.microsoft.com/office/drawing/2016/SVG/main" r:embed="rId4"/>
-              </a:ext>
             </a:extLst>
           </a:blip>
-          <a:srcRect/>
           <a:stretch>
             <a:fillRect/>
           </a:stretch>
         </p:blipFill>
-        <p:spPr/>
+        <p:spPr>
+          <a:xfrm>
+            <a:off x="0" y="0"/>
+            <a:ext cx="1328400" cy="1328400"/>
+          </a:xfrm>
+        </p:spPr>
       </p:pic>
       <p:pic>
         <p:nvPicPr>
@@ -47895,7 +47898,7 @@
           </p:nvPr>
         </p:nvPicPr>
         <p:blipFill>
-          <a:blip r:embed="rId5">
+          <a:blip r:embed="rId4">
             <a:extLst>
               <a:ext uri="{28A0092B-C50C-407E-A947-70E740481C1C}">
                 <a14:useLocalDpi xmlns:a14="http://schemas.microsoft.com/office/drawing/2010/main" val="0"/>
@@ -48518,7 +48521,7 @@
       </p:grpSpPr>
       <p:pic>
         <p:nvPicPr>
-          <p:cNvPr id="9" name="Kép helyőrzője 8" descr="Céges embléma">
+          <p:cNvPr id="9" name="Kép helyőrzője 8">
             <a:extLst>
               <a:ext uri="{FF2B5EF4-FFF2-40B4-BE49-F238E27FC236}">
                 <a16:creationId xmlns:a16="http://schemas.microsoft.com/office/drawing/2014/main" id="{4826D6B4-2F2D-4028-9520-001218B5ECB2}"/>
@@ -48538,17 +48541,18 @@
               <a:ext uri="{28A0092B-C50C-407E-A947-70E740481C1C}">
                 <a14:useLocalDpi xmlns:a14="http://schemas.microsoft.com/office/drawing/2010/main" val="0"/>
               </a:ext>
-              <a:ext uri="{96DAC541-7B7A-43D3-8B79-37D633B846F1}">
-                <asvg:svgBlip xmlns="" xmlns:asvg="http://schemas.microsoft.com/office/drawing/2016/SVG/main" r:embed="rId4"/>
-              </a:ext>
             </a:extLst>
           </a:blip>
-          <a:srcRect/>
           <a:stretch>
             <a:fillRect/>
           </a:stretch>
         </p:blipFill>
-        <p:spPr/>
+        <p:spPr>
+          <a:xfrm>
+            <a:off x="0" y="0"/>
+            <a:ext cx="1328400" cy="1328400"/>
+          </a:xfrm>
+        </p:spPr>
       </p:pic>
       <p:sp>
         <p:nvSpPr>
@@ -48597,7 +48601,7 @@
           </p:nvPr>
         </p:nvPicPr>
         <p:blipFill>
-          <a:blip r:embed="rId5">
+          <a:blip r:embed="rId4">
             <a:extLst>
               <a:ext uri="{28A0092B-C50C-407E-A947-70E740481C1C}">
                 <a14:useLocalDpi xmlns:a14="http://schemas.microsoft.com/office/drawing/2010/main" val="0"/>
@@ -51548,7 +51552,7 @@
       </p:grpSpPr>
       <p:pic>
         <p:nvPicPr>
-          <p:cNvPr id="11" name="Kép helyőrzője 10" descr="Céges embléma">
+          <p:cNvPr id="11" name="Kép helyőrzője 10">
             <a:extLst>
               <a:ext uri="{FF2B5EF4-FFF2-40B4-BE49-F238E27FC236}">
                 <a16:creationId xmlns:a16="http://schemas.microsoft.com/office/drawing/2014/main" id="{F137CA39-CE16-4C0C-AFB5-324FE940E664}"/>
@@ -51568,17 +51572,18 @@
               <a:ext uri="{28A0092B-C50C-407E-A947-70E740481C1C}">
                 <a14:useLocalDpi xmlns:a14="http://schemas.microsoft.com/office/drawing/2010/main" val="0"/>
               </a:ext>
-              <a:ext uri="{96DAC541-7B7A-43D3-8B79-37D633B846F1}">
-                <asvg:svgBlip xmlns="" xmlns:asvg="http://schemas.microsoft.com/office/drawing/2016/SVG/main" r:embed="rId4"/>
-              </a:ext>
             </a:extLst>
           </a:blip>
-          <a:srcRect/>
           <a:stretch>
             <a:fillRect/>
           </a:stretch>
         </p:blipFill>
-        <p:spPr/>
+        <p:spPr>
+          <a:xfrm>
+            <a:off x="0" y="0"/>
+            <a:ext cx="1328400" cy="1328400"/>
+          </a:xfrm>
+        </p:spPr>
       </p:pic>
       <p:sp>
         <p:nvSpPr>
@@ -51953,7 +51958,7 @@
           </p:nvPr>
         </p:nvPicPr>
         <p:blipFill>
-          <a:blip r:embed="rId5">
+          <a:blip r:embed="rId4">
             <a:extLst>
               <a:ext uri="{28A0092B-C50C-407E-A947-70E740481C1C}">
                 <a14:useLocalDpi xmlns:a14="http://schemas.microsoft.com/office/drawing/2010/main" val="0"/>
@@ -52100,10 +52105,10 @@
       </p:grpSpPr>
       <p:pic>
         <p:nvPicPr>
-          <p:cNvPr id="11" name="Kép helyőrzője 10" descr="Céges embléma">
-            <a:extLst>
-              <a:ext uri="{FF2B5EF4-FFF2-40B4-BE49-F238E27FC236}">
-                <a16:creationId xmlns:a16="http://schemas.microsoft.com/office/drawing/2014/main" id="{F137CA39-CE16-4C0C-AFB5-324FE940E664}"/>
+          <p:cNvPr id="9" name="Kép helyőrzője 8">
+            <a:extLst>
+              <a:ext uri="{FF2B5EF4-FFF2-40B4-BE49-F238E27FC236}">
+                <a16:creationId xmlns:a16="http://schemas.microsoft.com/office/drawing/2014/main" id="{00A900CE-F052-47BC-8B74-B92A4604BF6A}"/>
               </a:ext>
             </a:extLst>
           </p:cNvPr>
@@ -52116,396 +52121,6 @@
         </p:nvPicPr>
         <p:blipFill>
           <a:blip r:embed="rId3">
-            <a:extLst>
-              <a:ext uri="{28A0092B-C50C-407E-A947-70E740481C1C}">
-                <a14:useLocalDpi xmlns:a14="http://schemas.microsoft.com/office/drawing/2010/main" val="0"/>
-              </a:ext>
-              <a:ext uri="{96DAC541-7B7A-43D3-8B79-37D633B846F1}">
-                <asvg:svgBlip xmlns="" xmlns:asvg="http://schemas.microsoft.com/office/drawing/2016/SVG/main" r:embed="rId4"/>
-              </a:ext>
-            </a:extLst>
-          </a:blip>
-          <a:srcRect/>
-          <a:stretch>
-            <a:fillRect/>
-          </a:stretch>
-        </p:blipFill>
-        <p:spPr/>
-      </p:pic>
-      <p:sp>
-        <p:nvSpPr>
-          <p:cNvPr id="2" name="Cím 1">
-            <a:extLst>
-              <a:ext uri="{FF2B5EF4-FFF2-40B4-BE49-F238E27FC236}">
-                <a16:creationId xmlns:a16="http://schemas.microsoft.com/office/drawing/2014/main" id="{134CB059-9E3B-4C24-8E61-717292C2944E}"/>
-              </a:ext>
-            </a:extLst>
-          </p:cNvPr>
-          <p:cNvSpPr>
-            <a:spLocks noGrp="1"/>
-          </p:cNvSpPr>
-          <p:nvPr>
-            <p:ph type="title"/>
-          </p:nvPr>
-        </p:nvSpPr>
-        <p:spPr/>
-        <p:txBody>
-          <a:bodyPr rtlCol="0"/>
-          <a:lstStyle/>
-          <a:p>
-            <a:pPr rtl="0"/>
-            <a:r>
-              <a:rPr lang="hu-HU" dirty="0" smtClean="0"/>
-              <a:t>TERMÉK</a:t>
-            </a:r>
-            <a:endParaRPr lang="hu-HU" dirty="0"/>
-          </a:p>
-        </p:txBody>
-      </p:sp>
-      <p:sp>
-        <p:nvSpPr>
-          <p:cNvPr id="3" name="Szöveg helye 2">
-            <a:extLst>
-              <a:ext uri="{FF2B5EF4-FFF2-40B4-BE49-F238E27FC236}">
-                <a16:creationId xmlns:a16="http://schemas.microsoft.com/office/drawing/2014/main" id="{E66139D5-668D-4A3D-B6B6-F71EC385C8FF}"/>
-              </a:ext>
-            </a:extLst>
-          </p:cNvPr>
-          <p:cNvSpPr>
-            <a:spLocks noGrp="1"/>
-          </p:cNvSpPr>
-          <p:nvPr>
-            <p:ph type="body" idx="1"/>
-          </p:nvPr>
-        </p:nvSpPr>
-        <p:spPr/>
-        <p:txBody>
-          <a:bodyPr rtlCol="0"/>
-          <a:lstStyle/>
-          <a:p>
-            <a:pPr rtl="0"/>
-            <a:r>
-              <a:rPr lang="hu-HU" dirty="0" smtClean="0"/>
-              <a:t>LOREM IPSUM DOLOR SIT AMET, CONSECTETUER ADIPISCING ELIT</a:t>
-            </a:r>
-          </a:p>
-          <a:p>
-            <a:pPr rtl="0"/>
-            <a:endParaRPr lang="hu-HU" dirty="0"/>
-          </a:p>
-        </p:txBody>
-      </p:sp>
-      <p:sp>
-        <p:nvSpPr>
-          <p:cNvPr id="8" name="Szöveg helye 7">
-            <a:extLst>
-              <a:ext uri="{FF2B5EF4-FFF2-40B4-BE49-F238E27FC236}">
-                <a16:creationId xmlns:a16="http://schemas.microsoft.com/office/drawing/2014/main" id="{EEA947F5-DD66-4D26-BA34-D1D8F7CE9010}"/>
-              </a:ext>
-            </a:extLst>
-          </p:cNvPr>
-          <p:cNvSpPr>
-            <a:spLocks noGrp="1"/>
-          </p:cNvSpPr>
-          <p:nvPr>
-            <p:ph type="body" idx="14"/>
-          </p:nvPr>
-        </p:nvSpPr>
-        <p:spPr/>
-        <p:txBody>
-          <a:bodyPr rtlCol="0">
-            <a:normAutofit fontScale="92500" lnSpcReduction="10000"/>
-          </a:bodyPr>
-          <a:lstStyle/>
-          <a:p>
-            <a:pPr rtl="0"/>
-            <a:r>
-              <a:rPr lang="hu-HU" dirty="0" err="1" smtClean="0"/>
-              <a:t>Lorem</a:t>
-            </a:r>
-            <a:r>
-              <a:rPr lang="hu-HU" dirty="0" smtClean="0"/>
-              <a:t> </a:t>
-            </a:r>
-            <a:r>
-              <a:rPr lang="hu-HU" dirty="0" err="1" smtClean="0"/>
-              <a:t>ipsum</a:t>
-            </a:r>
-            <a:r>
-              <a:rPr lang="hu-HU" dirty="0" smtClean="0"/>
-              <a:t> </a:t>
-            </a:r>
-            <a:r>
-              <a:rPr lang="hu-HU" dirty="0" err="1" smtClean="0"/>
-              <a:t>dolor</a:t>
-            </a:r>
-            <a:r>
-              <a:rPr lang="hu-HU" dirty="0" smtClean="0"/>
-              <a:t> </a:t>
-            </a:r>
-            <a:r>
-              <a:rPr lang="hu-HU" dirty="0" err="1" smtClean="0"/>
-              <a:t>sit</a:t>
-            </a:r>
-            <a:r>
-              <a:rPr lang="hu-HU" dirty="0" smtClean="0"/>
-              <a:t> </a:t>
-            </a:r>
-            <a:r>
-              <a:rPr lang="hu-HU" dirty="0" err="1" smtClean="0"/>
-              <a:t>amet</a:t>
-            </a:r>
-            <a:r>
-              <a:rPr lang="hu-HU" dirty="0" smtClean="0"/>
-              <a:t>, </a:t>
-            </a:r>
-            <a:r>
-              <a:rPr lang="hu-HU" dirty="0" err="1" smtClean="0"/>
-              <a:t>consectetuer</a:t>
-            </a:r>
-            <a:r>
-              <a:rPr lang="hu-HU" dirty="0" smtClean="0"/>
-              <a:t> </a:t>
-            </a:r>
-            <a:r>
-              <a:rPr lang="hu-HU" dirty="0" err="1" smtClean="0"/>
-              <a:t>adipiscing</a:t>
-            </a:r>
-            <a:r>
-              <a:rPr lang="hu-HU" dirty="0" smtClean="0"/>
-              <a:t> elit. Maecenas </a:t>
-            </a:r>
-            <a:r>
-              <a:rPr lang="hu-HU" dirty="0" err="1" smtClean="0"/>
-              <a:t>porttitor</a:t>
-            </a:r>
-            <a:r>
-              <a:rPr lang="hu-HU" dirty="0" smtClean="0"/>
-              <a:t> </a:t>
-            </a:r>
-            <a:r>
-              <a:rPr lang="hu-HU" dirty="0" err="1" smtClean="0"/>
-              <a:t>congue</a:t>
-            </a:r>
-            <a:r>
-              <a:rPr lang="hu-HU" dirty="0" smtClean="0"/>
-              <a:t> </a:t>
-            </a:r>
-            <a:r>
-              <a:rPr lang="hu-HU" dirty="0" err="1" smtClean="0"/>
-              <a:t>massa</a:t>
-            </a:r>
-            <a:r>
-              <a:rPr lang="hu-HU" dirty="0" smtClean="0"/>
-              <a:t>. </a:t>
-            </a:r>
-          </a:p>
-          <a:p>
-            <a:pPr rtl="0"/>
-            <a:r>
-              <a:rPr lang="hu-HU" dirty="0" err="1" smtClean="0"/>
-              <a:t>Nunc</a:t>
-            </a:r>
-            <a:r>
-              <a:rPr lang="hu-HU" dirty="0" smtClean="0"/>
-              <a:t> </a:t>
-            </a:r>
-            <a:r>
-              <a:rPr lang="hu-HU" dirty="0" err="1" smtClean="0"/>
-              <a:t>viverra</a:t>
-            </a:r>
-            <a:r>
-              <a:rPr lang="hu-HU" dirty="0" smtClean="0"/>
-              <a:t> </a:t>
-            </a:r>
-            <a:r>
-              <a:rPr lang="hu-HU" dirty="0" err="1" smtClean="0"/>
-              <a:t>imperdiet</a:t>
-            </a:r>
-            <a:r>
-              <a:rPr lang="hu-HU" dirty="0" smtClean="0"/>
-              <a:t> </a:t>
-            </a:r>
-            <a:r>
-              <a:rPr lang="hu-HU" dirty="0" err="1" smtClean="0"/>
-              <a:t>enim</a:t>
-            </a:r>
-            <a:r>
-              <a:rPr lang="hu-HU" dirty="0" smtClean="0"/>
-              <a:t>. </a:t>
-            </a:r>
-            <a:r>
-              <a:rPr lang="hu-HU" dirty="0" err="1" smtClean="0"/>
-              <a:t>Fusce</a:t>
-            </a:r>
-            <a:r>
-              <a:rPr lang="hu-HU" dirty="0" smtClean="0"/>
-              <a:t> est. </a:t>
-            </a:r>
-            <a:r>
-              <a:rPr lang="hu-HU" dirty="0" err="1" smtClean="0"/>
-              <a:t>Vivamus</a:t>
-            </a:r>
-            <a:r>
-              <a:rPr lang="hu-HU" dirty="0" smtClean="0"/>
-              <a:t> a </a:t>
-            </a:r>
-            <a:r>
-              <a:rPr lang="hu-HU" dirty="0" err="1" smtClean="0"/>
-              <a:t>tellus</a:t>
-            </a:r>
-            <a:r>
-              <a:rPr lang="hu-HU" dirty="0" smtClean="0"/>
-              <a:t>.</a:t>
-            </a:r>
-          </a:p>
-          <a:p>
-            <a:pPr rtl="0"/>
-            <a:r>
-              <a:rPr lang="hu-HU" dirty="0" err="1" smtClean="0"/>
-              <a:t>Pellentesque</a:t>
-            </a:r>
-            <a:r>
-              <a:rPr lang="hu-HU" dirty="0" smtClean="0"/>
-              <a:t> habitant </a:t>
-            </a:r>
-            <a:r>
-              <a:rPr lang="hu-HU" dirty="0" err="1" smtClean="0"/>
-              <a:t>morbi</a:t>
-            </a:r>
-            <a:r>
-              <a:rPr lang="hu-HU" dirty="0" smtClean="0"/>
-              <a:t> </a:t>
-            </a:r>
-            <a:r>
-              <a:rPr lang="hu-HU" dirty="0" err="1" smtClean="0"/>
-              <a:t>tristique</a:t>
-            </a:r>
-            <a:r>
-              <a:rPr lang="hu-HU" dirty="0" smtClean="0"/>
-              <a:t> </a:t>
-            </a:r>
-            <a:r>
-              <a:rPr lang="hu-HU" dirty="0" err="1" smtClean="0"/>
-              <a:t>senectus</a:t>
-            </a:r>
-            <a:r>
-              <a:rPr lang="hu-HU" dirty="0" smtClean="0"/>
-              <a:t> et </a:t>
-            </a:r>
-            <a:r>
-              <a:rPr lang="hu-HU" dirty="0" err="1" smtClean="0"/>
-              <a:t>netus</a:t>
-            </a:r>
-            <a:r>
-              <a:rPr lang="hu-HU" dirty="0" smtClean="0"/>
-              <a:t> et </a:t>
-            </a:r>
-            <a:r>
-              <a:rPr lang="hu-HU" dirty="0" err="1" smtClean="0"/>
-              <a:t>malesuada</a:t>
-            </a:r>
-            <a:r>
-              <a:rPr lang="hu-HU" dirty="0" smtClean="0"/>
-              <a:t> </a:t>
-            </a:r>
-            <a:r>
-              <a:rPr lang="hu-HU" dirty="0" err="1" smtClean="0"/>
-              <a:t>fames</a:t>
-            </a:r>
-            <a:r>
-              <a:rPr lang="hu-HU" dirty="0" smtClean="0"/>
-              <a:t> </a:t>
-            </a:r>
-            <a:r>
-              <a:rPr lang="hu-HU" dirty="0" err="1" smtClean="0"/>
-              <a:t>ac</a:t>
-            </a:r>
-            <a:r>
-              <a:rPr lang="hu-HU" dirty="0" smtClean="0"/>
-              <a:t> turpis </a:t>
-            </a:r>
-            <a:r>
-              <a:rPr lang="hu-HU" dirty="0" err="1" smtClean="0"/>
-              <a:t>egestas</a:t>
-            </a:r>
-            <a:r>
-              <a:rPr lang="hu-HU" dirty="0" smtClean="0"/>
-              <a:t>. </a:t>
-            </a:r>
-            <a:r>
-              <a:rPr lang="hu-HU" dirty="0" err="1" smtClean="0"/>
-              <a:t>Proin</a:t>
-            </a:r>
-            <a:r>
-              <a:rPr lang="hu-HU" dirty="0" smtClean="0"/>
-              <a:t> </a:t>
-            </a:r>
-            <a:r>
-              <a:rPr lang="hu-HU" dirty="0" err="1" smtClean="0"/>
-              <a:t>pharetra</a:t>
-            </a:r>
-            <a:r>
-              <a:rPr lang="hu-HU" dirty="0" smtClean="0"/>
-              <a:t> </a:t>
-            </a:r>
-            <a:r>
-              <a:rPr lang="hu-HU" dirty="0" err="1" smtClean="0"/>
-              <a:t>nonummy</a:t>
-            </a:r>
-            <a:r>
-              <a:rPr lang="hu-HU" dirty="0" smtClean="0"/>
-              <a:t> </a:t>
-            </a:r>
-            <a:r>
-              <a:rPr lang="hu-HU" dirty="0" err="1" smtClean="0"/>
-              <a:t>pede</a:t>
-            </a:r>
-            <a:r>
-              <a:rPr lang="hu-HU" dirty="0" smtClean="0"/>
-              <a:t>. </a:t>
-            </a:r>
-            <a:r>
-              <a:rPr lang="hu-HU" dirty="0" err="1" smtClean="0"/>
-              <a:t>Mauris</a:t>
-            </a:r>
-            <a:r>
-              <a:rPr lang="hu-HU" dirty="0" smtClean="0"/>
-              <a:t> et </a:t>
-            </a:r>
-            <a:r>
-              <a:rPr lang="hu-HU" dirty="0" err="1" smtClean="0"/>
-              <a:t>orci</a:t>
-            </a:r>
-            <a:r>
-              <a:rPr lang="hu-HU" dirty="0" smtClean="0"/>
-              <a:t>.</a:t>
-            </a:r>
-          </a:p>
-          <a:p>
-            <a:pPr rtl="0"/>
-            <a:endParaRPr lang="hu-HU" dirty="0"/>
-          </a:p>
-        </p:txBody>
-      </p:sp>
-      <p:pic>
-        <p:nvPicPr>
-          <p:cNvPr id="13" name="Kép helyőrzője 12">
-            <a:extLst>
-              <a:ext uri="{FF2B5EF4-FFF2-40B4-BE49-F238E27FC236}">
-                <a16:creationId xmlns:a16="http://schemas.microsoft.com/office/drawing/2014/main" id="{0B7AE772-6658-4E84-8EAA-F33DEF1CDE4F}"/>
-              </a:ext>
-            </a:extLst>
-          </p:cNvPr>
-          <p:cNvPicPr>
-            <a:picLocks noGrp="1" noChangeAspect="1"/>
-          </p:cNvPicPr>
-          <p:nvPr>
-            <p:ph type="pic" sz="quarter" idx="15"/>
-          </p:nvPr>
-        </p:nvPicPr>
-        <p:blipFill>
-          <a:blip r:embed="rId5">
             <a:extLst>
               <a:ext uri="{28A0092B-C50C-407E-A947-70E740481C1C}">
                 <a14:useLocalDpi xmlns:a14="http://schemas.microsoft.com/office/drawing/2010/main" val="0"/>
@@ -52518,17 +52133,120 @@
         </p:blipFill>
         <p:spPr>
           <a:xfrm>
-            <a:off x="6362829" y="1653871"/>
-            <a:ext cx="4832608" cy="3132814"/>
+            <a:off x="0" y="0"/>
+            <a:ext cx="1328400" cy="1328400"/>
           </a:xfrm>
         </p:spPr>
       </p:pic>
       <p:sp>
         <p:nvSpPr>
+          <p:cNvPr id="2" name="Cím 1">
+            <a:extLst>
+              <a:ext uri="{FF2B5EF4-FFF2-40B4-BE49-F238E27FC236}">
+                <a16:creationId xmlns:a16="http://schemas.microsoft.com/office/drawing/2014/main" id="{9A6E18C9-A34F-49C5-973E-6760D1EF1059}"/>
+              </a:ext>
+            </a:extLst>
+          </p:cNvPr>
+          <p:cNvSpPr>
+            <a:spLocks noGrp="1"/>
+          </p:cNvSpPr>
+          <p:nvPr>
+            <p:ph type="title"/>
+          </p:nvPr>
+        </p:nvSpPr>
+        <p:spPr/>
+        <p:txBody>
+          <a:bodyPr rtlCol="0"/>
+          <a:lstStyle/>
+          <a:p>
+            <a:pPr rtl="0"/>
+            <a:r>
+              <a:rPr lang="hu-HU" dirty="0" smtClean="0"/>
+              <a:t>Weboldal</a:t>
+            </a:r>
+            <a:endParaRPr lang="hu-HU" dirty="0"/>
+          </a:p>
+        </p:txBody>
+      </p:sp>
+      <p:pic>
+        <p:nvPicPr>
+          <p:cNvPr id="22" name="Kép helyőrzője 21" descr="Absztrakt háttér">
+            <a:extLst>
+              <a:ext uri="{FF2B5EF4-FFF2-40B4-BE49-F238E27FC236}">
+                <a16:creationId xmlns:a16="http://schemas.microsoft.com/office/drawing/2014/main" id="{0342E5A4-E598-4185-B93F-5814F00C2011}"/>
+              </a:ext>
+            </a:extLst>
+          </p:cNvPr>
+          <p:cNvPicPr>
+            <a:picLocks noGrp="1" noChangeAspect="1"/>
+          </p:cNvPicPr>
+          <p:nvPr>
+            <p:ph type="pic" sz="quarter" idx="15"/>
+          </p:nvPr>
+        </p:nvPicPr>
+        <p:blipFill>
+          <a:blip r:embed="rId4">
+            <a:extLst>
+              <a:ext uri="{28A0092B-C50C-407E-A947-70E740481C1C}">
+                <a14:useLocalDpi xmlns:a14="http://schemas.microsoft.com/office/drawing/2010/main" val="0"/>
+              </a:ext>
+            </a:extLst>
+          </a:blip>
+          <a:srcRect/>
+          <a:stretch>
+            <a:fillRect/>
+          </a:stretch>
+        </p:blipFill>
+        <p:spPr>
+          <a:xfrm>
+            <a:off x="1" y="1690447"/>
+            <a:ext cx="12191999" cy="3493008"/>
+          </a:xfrm>
+        </p:spPr>
+      </p:pic>
+      <p:sp>
+        <p:nvSpPr>
+          <p:cNvPr id="3" name="Szöveg helye 2">
+            <a:extLst>
+              <a:ext uri="{FF2B5EF4-FFF2-40B4-BE49-F238E27FC236}">
+                <a16:creationId xmlns:a16="http://schemas.microsoft.com/office/drawing/2014/main" id="{C679F2E6-BA14-4C8A-ABD2-DF50609348D1}"/>
+              </a:ext>
+            </a:extLst>
+          </p:cNvPr>
+          <p:cNvSpPr>
+            <a:spLocks noGrp="1"/>
+          </p:cNvSpPr>
+          <p:nvPr>
+            <p:ph type="body" idx="1"/>
+          </p:nvPr>
+        </p:nvSpPr>
+        <p:spPr>
+          <a:xfrm>
+            <a:off x="3863976" y="2571484"/>
+            <a:ext cx="4443165" cy="370500"/>
+          </a:xfrm>
+        </p:spPr>
+        <p:txBody>
+          <a:bodyPr rtlCol="0">
+            <a:normAutofit/>
+          </a:bodyPr>
+          <a:lstStyle/>
+          <a:p>
+            <a:pPr rtl="0"/>
+            <a:r>
+              <a:rPr lang="hu-HU" sz="2400" dirty="0" smtClean="0"/>
+              <a:t>A programot bemutató weboldal</a:t>
+            </a:r>
+            <a:endParaRPr lang="hu-HU" sz="2400" dirty="0"/>
+          </a:p>
+        </p:txBody>
+      </p:sp>
+      <p:sp>
+        <p:nvSpPr>
           <p:cNvPr id="6" name="Dia számának helye 5">
             <a:extLst>
               <a:ext uri="{FF2B5EF4-FFF2-40B4-BE49-F238E27FC236}">
-                <a16:creationId xmlns:a16="http://schemas.microsoft.com/office/drawing/2014/main" id="{2B9E0CB5-2F64-4439-AFE9-1BB3ACE6FA9D}"/>
+                <a16:creationId xmlns:a16="http://schemas.microsoft.com/office/drawing/2014/main" id="{C35D9EA8-AA17-47B2-A4C4-B60DC7C7DC49}"/>
               </a:ext>
             </a:extLst>
           </p:cNvPr>
@@ -52547,6 +52265,7 @@
             <a:pPr rtl="0"/>
             <a:fld id="{8D581BC7-E183-40DB-AC97-C19EA4EB8894}" type="slidenum">
               <a:rPr lang="hu-HU" smtClean="0"/>
+              <a:pPr rtl="0"/>
               <a:t>6</a:t>
             </a:fld>
             <a:endParaRPr lang="hu-HU" dirty="0"/>
@@ -52558,7 +52277,7 @@
           <p:cNvPr id="5" name="Élőláb helye 4">
             <a:extLst>
               <a:ext uri="{FF2B5EF4-FFF2-40B4-BE49-F238E27FC236}">
-                <a16:creationId xmlns:a16="http://schemas.microsoft.com/office/drawing/2014/main" id="{FFFF8DFC-D37E-4FE9-81F0-77C68D469526}"/>
+                <a16:creationId xmlns:a16="http://schemas.microsoft.com/office/drawing/2014/main" id="{1ED7D25D-51F0-4AAA-86C5-F3584C0E8A44}"/>
               </a:ext>
             </a:extLst>
           </p:cNvPr>
@@ -52574,12 +52293,10 @@
           <a:bodyPr rtlCol="0"/>
           <a:lstStyle/>
           <a:p>
-            <a:pPr rtl="0"/>
-            <a:r>
-              <a:rPr lang="hu-HU" dirty="0" smtClean="0"/>
-              <a:t>ÉLŐLÁB HOZZÁADÁSA</a:t>
-            </a:r>
-            <a:endParaRPr lang="hu-HU" dirty="0"/>
+            <a:r>
+              <a:rPr lang="hu-HU" dirty="0"/>
+              <a:t>A programot bemutató weboldal</a:t>
+            </a:r>
           </a:p>
         </p:txBody>
       </p:sp>
@@ -52588,7 +52305,7 @@
           <p:cNvPr id="4" name="Dátum helye 3">
             <a:extLst>
               <a:ext uri="{FF2B5EF4-FFF2-40B4-BE49-F238E27FC236}">
-                <a16:creationId xmlns:a16="http://schemas.microsoft.com/office/drawing/2014/main" id="{0BA396AE-BE46-43FB-B4E7-224D2AF39F83}"/>
+                <a16:creationId xmlns:a16="http://schemas.microsoft.com/office/drawing/2014/main" id="{F48CF653-A1E7-473E-A717-8659C5E457A1}"/>
               </a:ext>
             </a:extLst>
           </p:cNvPr>
@@ -52607,7 +52324,7 @@
             <a:pPr rtl="0"/>
             <a:r>
               <a:rPr lang="hu-HU" dirty="0" smtClean="0"/>
-              <a:t>20XX.HH.NN </a:t>
+              <a:t>2022.12.01 </a:t>
             </a:r>
             <a:endParaRPr lang="hu-HU" dirty="0"/>
           </a:p>
@@ -52616,7 +52333,7 @@
     </p:spTree>
     <p:extLst>
       <p:ext uri="{BB962C8B-B14F-4D97-AF65-F5344CB8AC3E}">
-        <p14:creationId xmlns:p14="http://schemas.microsoft.com/office/powerpoint/2010/main" val="1728754232"/>
+        <p14:creationId xmlns:p14="http://schemas.microsoft.com/office/powerpoint/2010/main" val="4080312334"/>
       </p:ext>
     </p:extLst>
   </p:cSld>
@@ -52652,10 +52369,10 @@
       </p:grpSpPr>
       <p:pic>
         <p:nvPicPr>
-          <p:cNvPr id="9" name="Kép helyőrzője 8" descr="Céges embléma">
-            <a:extLst>
-              <a:ext uri="{FF2B5EF4-FFF2-40B4-BE49-F238E27FC236}">
-                <a16:creationId xmlns:a16="http://schemas.microsoft.com/office/drawing/2014/main" id="{00A900CE-F052-47BC-8B74-B92A4604BF6A}"/>
+          <p:cNvPr id="11" name="Kép helyőrzője 10">
+            <a:extLst>
+              <a:ext uri="{FF2B5EF4-FFF2-40B4-BE49-F238E27FC236}">
+                <a16:creationId xmlns:a16="http://schemas.microsoft.com/office/drawing/2014/main" id="{F137CA39-CE16-4C0C-AFB5-324FE940E664}"/>
               </a:ext>
             </a:extLst>
           </p:cNvPr>
@@ -52672,24 +52389,25 @@
               <a:ext uri="{28A0092B-C50C-407E-A947-70E740481C1C}">
                 <a14:useLocalDpi xmlns:a14="http://schemas.microsoft.com/office/drawing/2010/main" val="0"/>
               </a:ext>
-              <a:ext uri="{96DAC541-7B7A-43D3-8B79-37D633B846F1}">
-                <asvg:svgBlip xmlns="" xmlns:asvg="http://schemas.microsoft.com/office/drawing/2016/SVG/main" r:embed="rId4"/>
-              </a:ext>
             </a:extLst>
           </a:blip>
-          <a:srcRect/>
           <a:stretch>
             <a:fillRect/>
           </a:stretch>
         </p:blipFill>
-        <p:spPr/>
+        <p:spPr>
+          <a:xfrm>
+            <a:off x="0" y="0"/>
+            <a:ext cx="1328400" cy="1328400"/>
+          </a:xfrm>
+        </p:spPr>
       </p:pic>
       <p:sp>
         <p:nvSpPr>
           <p:cNvPr id="2" name="Cím 1">
             <a:extLst>
               <a:ext uri="{FF2B5EF4-FFF2-40B4-BE49-F238E27FC236}">
-                <a16:creationId xmlns:a16="http://schemas.microsoft.com/office/drawing/2014/main" id="{9A6E18C9-A34F-49C5-973E-6760D1EF1059}"/>
+                <a16:creationId xmlns:a16="http://schemas.microsoft.com/office/drawing/2014/main" id="{134CB059-9E3B-4C24-8E61-717292C2944E}"/>
               </a:ext>
             </a:extLst>
           </p:cNvPr>
@@ -52698,6 +52416,43 @@
           </p:cNvSpPr>
           <p:nvPr>
             <p:ph type="title"/>
+          </p:nvPr>
+        </p:nvSpPr>
+        <p:spPr>
+          <a:xfrm>
+            <a:off x="803276" y="2091023"/>
+            <a:ext cx="4858053" cy="804338"/>
+          </a:xfrm>
+        </p:spPr>
+        <p:txBody>
+          <a:bodyPr rtlCol="0">
+            <a:normAutofit fontScale="90000"/>
+          </a:bodyPr>
+          <a:lstStyle/>
+          <a:p>
+            <a:pPr rtl="0"/>
+            <a:r>
+              <a:rPr lang="hu-HU" dirty="0" smtClean="0"/>
+              <a:t>Weboldal webesnézetben</a:t>
+            </a:r>
+            <a:endParaRPr lang="hu-HU" dirty="0"/>
+          </a:p>
+        </p:txBody>
+      </p:sp>
+      <p:sp>
+        <p:nvSpPr>
+          <p:cNvPr id="3" name="Szöveg helye 2">
+            <a:extLst>
+              <a:ext uri="{FF2B5EF4-FFF2-40B4-BE49-F238E27FC236}">
+                <a16:creationId xmlns:a16="http://schemas.microsoft.com/office/drawing/2014/main" id="{E66139D5-668D-4A3D-B6B6-F71EC385C8FF}"/>
+              </a:ext>
+            </a:extLst>
+          </p:cNvPr>
+          <p:cNvSpPr>
+            <a:spLocks noGrp="1"/>
+          </p:cNvSpPr>
+          <p:nvPr>
+            <p:ph type="body" idx="1"/>
           </p:nvPr>
         </p:nvSpPr>
         <p:spPr/>
@@ -52708,69 +52463,304 @@
             <a:pPr rtl="0"/>
             <a:r>
               <a:rPr lang="hu-HU" dirty="0" smtClean="0"/>
-              <a:t>ELVÁLASZTÓ</a:t>
-            </a:r>
+              <a:t>LOREM IPSUM DOLOR SIT AMET, CONSECTETUER ADIPISCING ELIT</a:t>
+            </a:r>
+          </a:p>
+          <a:p>
+            <a:pPr rtl="0"/>
             <a:endParaRPr lang="hu-HU" dirty="0"/>
           </a:p>
         </p:txBody>
       </p:sp>
-      <p:pic>
-        <p:nvPicPr>
-          <p:cNvPr id="22" name="Kép helyőrzője 21" descr="Absztrakt háttér">
-            <a:extLst>
-              <a:ext uri="{FF2B5EF4-FFF2-40B4-BE49-F238E27FC236}">
-                <a16:creationId xmlns:a16="http://schemas.microsoft.com/office/drawing/2014/main" id="{0342E5A4-E598-4185-B93F-5814F00C2011}"/>
-              </a:ext>
-            </a:extLst>
-          </p:cNvPr>
-          <p:cNvPicPr>
-            <a:picLocks noGrp="1" noChangeAspect="1"/>
-          </p:cNvPicPr>
-          <p:nvPr>
-            <p:ph type="pic" sz="quarter" idx="15"/>
-          </p:nvPr>
-        </p:nvPicPr>
-        <p:blipFill>
-          <a:blip r:embed="rId5">
-            <a:extLst>
-              <a:ext uri="{28A0092B-C50C-407E-A947-70E740481C1C}">
-                <a14:useLocalDpi xmlns:a14="http://schemas.microsoft.com/office/drawing/2010/main" val="0"/>
-              </a:ext>
-            </a:extLst>
-          </a:blip>
-          <a:srcRect/>
-          <a:stretch>
-            <a:fillRect/>
-          </a:stretch>
-        </p:blipFill>
+      <p:sp>
+        <p:nvSpPr>
+          <p:cNvPr id="8" name="Szöveg helye 7">
+            <a:extLst>
+              <a:ext uri="{FF2B5EF4-FFF2-40B4-BE49-F238E27FC236}">
+                <a16:creationId xmlns:a16="http://schemas.microsoft.com/office/drawing/2014/main" id="{EEA947F5-DD66-4D26-BA34-D1D8F7CE9010}"/>
+              </a:ext>
+            </a:extLst>
+          </p:cNvPr>
+          <p:cNvSpPr>
+            <a:spLocks noGrp="1"/>
+          </p:cNvSpPr>
+          <p:nvPr>
+            <p:ph type="body" idx="14"/>
+          </p:nvPr>
+        </p:nvSpPr>
         <p:spPr/>
-      </p:pic>
-      <p:sp>
-        <p:nvSpPr>
-          <p:cNvPr id="3" name="Szöveg helye 2">
-            <a:extLst>
-              <a:ext uri="{FF2B5EF4-FFF2-40B4-BE49-F238E27FC236}">
-                <a16:creationId xmlns:a16="http://schemas.microsoft.com/office/drawing/2014/main" id="{C679F2E6-BA14-4C8A-ABD2-DF50609348D1}"/>
-              </a:ext>
-            </a:extLst>
-          </p:cNvPr>
-          <p:cNvSpPr>
-            <a:spLocks noGrp="1"/>
-          </p:cNvSpPr>
-          <p:nvPr>
-            <p:ph type="body" idx="1"/>
-          </p:nvPr>
-        </p:nvSpPr>
-        <p:spPr/>
-        <p:txBody>
-          <a:bodyPr rtlCol="0"/>
+        <p:txBody>
+          <a:bodyPr rtlCol="0">
+            <a:normAutofit fontScale="92500" lnSpcReduction="10000"/>
+          </a:bodyPr>
           <a:lstStyle/>
           <a:p>
             <a:pPr rtl="0"/>
             <a:r>
+              <a:rPr lang="hu-HU" dirty="0" err="1" smtClean="0"/>
+              <a:t>Lorem</a:t>
+            </a:r>
+            <a:r>
               <a:rPr lang="hu-HU" dirty="0" smtClean="0"/>
-              <a:t>LOREM IPSUM DOLOR SIT AMET, CONSECTETUER ADIPISCING ELIT</a:t>
-            </a:r>
+              <a:t> </a:t>
+            </a:r>
+            <a:r>
+              <a:rPr lang="hu-HU" dirty="0" err="1" smtClean="0"/>
+              <a:t>ipsum</a:t>
+            </a:r>
+            <a:r>
+              <a:rPr lang="hu-HU" dirty="0" smtClean="0"/>
+              <a:t> </a:t>
+            </a:r>
+            <a:r>
+              <a:rPr lang="hu-HU" dirty="0" err="1" smtClean="0"/>
+              <a:t>dolor</a:t>
+            </a:r>
+            <a:r>
+              <a:rPr lang="hu-HU" dirty="0" smtClean="0"/>
+              <a:t> </a:t>
+            </a:r>
+            <a:r>
+              <a:rPr lang="hu-HU" dirty="0" err="1" smtClean="0"/>
+              <a:t>sit</a:t>
+            </a:r>
+            <a:r>
+              <a:rPr lang="hu-HU" dirty="0" smtClean="0"/>
+              <a:t> </a:t>
+            </a:r>
+            <a:r>
+              <a:rPr lang="hu-HU" dirty="0" err="1" smtClean="0"/>
+              <a:t>amet</a:t>
+            </a:r>
+            <a:r>
+              <a:rPr lang="hu-HU" dirty="0" smtClean="0"/>
+              <a:t>, </a:t>
+            </a:r>
+            <a:r>
+              <a:rPr lang="hu-HU" dirty="0" err="1" smtClean="0"/>
+              <a:t>consectetuer</a:t>
+            </a:r>
+            <a:r>
+              <a:rPr lang="hu-HU" dirty="0" smtClean="0"/>
+              <a:t> </a:t>
+            </a:r>
+            <a:r>
+              <a:rPr lang="hu-HU" dirty="0" err="1" smtClean="0"/>
+              <a:t>adipiscing</a:t>
+            </a:r>
+            <a:r>
+              <a:rPr lang="hu-HU" dirty="0" smtClean="0"/>
+              <a:t> elit. Maecenas </a:t>
+            </a:r>
+            <a:r>
+              <a:rPr lang="hu-HU" dirty="0" err="1" smtClean="0"/>
+              <a:t>porttitor</a:t>
+            </a:r>
+            <a:r>
+              <a:rPr lang="hu-HU" dirty="0" smtClean="0"/>
+              <a:t> </a:t>
+            </a:r>
+            <a:r>
+              <a:rPr lang="hu-HU" dirty="0" err="1" smtClean="0"/>
+              <a:t>congue</a:t>
+            </a:r>
+            <a:r>
+              <a:rPr lang="hu-HU" dirty="0" smtClean="0"/>
+              <a:t> </a:t>
+            </a:r>
+            <a:r>
+              <a:rPr lang="hu-HU" dirty="0" err="1" smtClean="0"/>
+              <a:t>massa</a:t>
+            </a:r>
+            <a:r>
+              <a:rPr lang="hu-HU" dirty="0" smtClean="0"/>
+              <a:t>. </a:t>
+            </a:r>
+          </a:p>
+          <a:p>
+            <a:pPr rtl="0"/>
+            <a:r>
+              <a:rPr lang="hu-HU" dirty="0" err="1" smtClean="0"/>
+              <a:t>Nunc</a:t>
+            </a:r>
+            <a:r>
+              <a:rPr lang="hu-HU" dirty="0" smtClean="0"/>
+              <a:t> </a:t>
+            </a:r>
+            <a:r>
+              <a:rPr lang="hu-HU" dirty="0" err="1" smtClean="0"/>
+              <a:t>viverra</a:t>
+            </a:r>
+            <a:r>
+              <a:rPr lang="hu-HU" dirty="0" smtClean="0"/>
+              <a:t> </a:t>
+            </a:r>
+            <a:r>
+              <a:rPr lang="hu-HU" dirty="0" err="1" smtClean="0"/>
+              <a:t>imperdiet</a:t>
+            </a:r>
+            <a:r>
+              <a:rPr lang="hu-HU" dirty="0" smtClean="0"/>
+              <a:t> </a:t>
+            </a:r>
+            <a:r>
+              <a:rPr lang="hu-HU" dirty="0" err="1" smtClean="0"/>
+              <a:t>enim</a:t>
+            </a:r>
+            <a:r>
+              <a:rPr lang="hu-HU" dirty="0" smtClean="0"/>
+              <a:t>. </a:t>
+            </a:r>
+            <a:r>
+              <a:rPr lang="hu-HU" dirty="0" err="1" smtClean="0"/>
+              <a:t>Fusce</a:t>
+            </a:r>
+            <a:r>
+              <a:rPr lang="hu-HU" dirty="0" smtClean="0"/>
+              <a:t> est. </a:t>
+            </a:r>
+            <a:r>
+              <a:rPr lang="hu-HU" dirty="0" err="1" smtClean="0"/>
+              <a:t>Vivamus</a:t>
+            </a:r>
+            <a:r>
+              <a:rPr lang="hu-HU" dirty="0" smtClean="0"/>
+              <a:t> a </a:t>
+            </a:r>
+            <a:r>
+              <a:rPr lang="hu-HU" dirty="0" err="1" smtClean="0"/>
+              <a:t>tellus</a:t>
+            </a:r>
+            <a:r>
+              <a:rPr lang="hu-HU" dirty="0" smtClean="0"/>
+              <a:t>.</a:t>
+            </a:r>
+          </a:p>
+          <a:p>
+            <a:pPr rtl="0"/>
+            <a:r>
+              <a:rPr lang="hu-HU" dirty="0" err="1" smtClean="0"/>
+              <a:t>Pellentesque</a:t>
+            </a:r>
+            <a:r>
+              <a:rPr lang="hu-HU" dirty="0" smtClean="0"/>
+              <a:t> habitant </a:t>
+            </a:r>
+            <a:r>
+              <a:rPr lang="hu-HU" dirty="0" err="1" smtClean="0"/>
+              <a:t>morbi</a:t>
+            </a:r>
+            <a:r>
+              <a:rPr lang="hu-HU" dirty="0" smtClean="0"/>
+              <a:t> </a:t>
+            </a:r>
+            <a:r>
+              <a:rPr lang="hu-HU" dirty="0" err="1" smtClean="0"/>
+              <a:t>tristique</a:t>
+            </a:r>
+            <a:r>
+              <a:rPr lang="hu-HU" dirty="0" smtClean="0"/>
+              <a:t> </a:t>
+            </a:r>
+            <a:r>
+              <a:rPr lang="hu-HU" dirty="0" err="1" smtClean="0"/>
+              <a:t>senectus</a:t>
+            </a:r>
+            <a:r>
+              <a:rPr lang="hu-HU" dirty="0" smtClean="0"/>
+              <a:t> et </a:t>
+            </a:r>
+            <a:r>
+              <a:rPr lang="hu-HU" dirty="0" err="1" smtClean="0"/>
+              <a:t>netus</a:t>
+            </a:r>
+            <a:r>
+              <a:rPr lang="hu-HU" dirty="0" smtClean="0"/>
+              <a:t> et </a:t>
+            </a:r>
+            <a:r>
+              <a:rPr lang="hu-HU" dirty="0" err="1" smtClean="0"/>
+              <a:t>malesuada</a:t>
+            </a:r>
+            <a:r>
+              <a:rPr lang="hu-HU" dirty="0" smtClean="0"/>
+              <a:t> </a:t>
+            </a:r>
+            <a:r>
+              <a:rPr lang="hu-HU" dirty="0" err="1" smtClean="0"/>
+              <a:t>fames</a:t>
+            </a:r>
+            <a:r>
+              <a:rPr lang="hu-HU" dirty="0" smtClean="0"/>
+              <a:t> </a:t>
+            </a:r>
+            <a:r>
+              <a:rPr lang="hu-HU" dirty="0" err="1" smtClean="0"/>
+              <a:t>ac</a:t>
+            </a:r>
+            <a:r>
+              <a:rPr lang="hu-HU" dirty="0" smtClean="0"/>
+              <a:t> turpis </a:t>
+            </a:r>
+            <a:r>
+              <a:rPr lang="hu-HU" dirty="0" err="1" smtClean="0"/>
+              <a:t>egestas</a:t>
+            </a:r>
+            <a:r>
+              <a:rPr lang="hu-HU" dirty="0" smtClean="0"/>
+              <a:t>. </a:t>
+            </a:r>
+            <a:r>
+              <a:rPr lang="hu-HU" dirty="0" err="1" smtClean="0"/>
+              <a:t>Proin</a:t>
+            </a:r>
+            <a:r>
+              <a:rPr lang="hu-HU" dirty="0" smtClean="0"/>
+              <a:t> </a:t>
+            </a:r>
+            <a:r>
+              <a:rPr lang="hu-HU" dirty="0" err="1" smtClean="0"/>
+              <a:t>pharetra</a:t>
+            </a:r>
+            <a:r>
+              <a:rPr lang="hu-HU" dirty="0" smtClean="0"/>
+              <a:t> </a:t>
+            </a:r>
+            <a:r>
+              <a:rPr lang="hu-HU" dirty="0" err="1" smtClean="0"/>
+              <a:t>nonummy</a:t>
+            </a:r>
+            <a:r>
+              <a:rPr lang="hu-HU" dirty="0" smtClean="0"/>
+              <a:t> </a:t>
+            </a:r>
+            <a:r>
+              <a:rPr lang="hu-HU" dirty="0" err="1" smtClean="0"/>
+              <a:t>pede</a:t>
+            </a:r>
+            <a:r>
+              <a:rPr lang="hu-HU" dirty="0" smtClean="0"/>
+              <a:t>. </a:t>
+            </a:r>
+            <a:r>
+              <a:rPr lang="hu-HU" dirty="0" err="1" smtClean="0"/>
+              <a:t>Mauris</a:t>
+            </a:r>
+            <a:r>
+              <a:rPr lang="hu-HU" dirty="0" smtClean="0"/>
+              <a:t> et </a:t>
+            </a:r>
+            <a:r>
+              <a:rPr lang="hu-HU" dirty="0" err="1" smtClean="0"/>
+              <a:t>orci</a:t>
+            </a:r>
+            <a:r>
+              <a:rPr lang="hu-HU" dirty="0" smtClean="0"/>
+              <a:t>.</a:t>
+            </a:r>
+          </a:p>
+          <a:p>
+            <a:pPr rtl="0"/>
             <a:endParaRPr lang="hu-HU" dirty="0"/>
           </a:p>
         </p:txBody>
@@ -52780,7 +52770,7 @@
           <p:cNvPr id="6" name="Dia számának helye 5">
             <a:extLst>
               <a:ext uri="{FF2B5EF4-FFF2-40B4-BE49-F238E27FC236}">
-                <a16:creationId xmlns:a16="http://schemas.microsoft.com/office/drawing/2014/main" id="{C35D9EA8-AA17-47B2-A4C4-B60DC7C7DC49}"/>
+                <a16:creationId xmlns:a16="http://schemas.microsoft.com/office/drawing/2014/main" id="{2B9E0CB5-2F64-4439-AFE9-1BB3ACE6FA9D}"/>
               </a:ext>
             </a:extLst>
           </p:cNvPr>
@@ -52799,7 +52789,6 @@
             <a:pPr rtl="0"/>
             <a:fld id="{8D581BC7-E183-40DB-AC97-C19EA4EB8894}" type="slidenum">
               <a:rPr lang="hu-HU" smtClean="0"/>
-              <a:pPr rtl="0"/>
               <a:t>7</a:t>
             </a:fld>
             <a:endParaRPr lang="hu-HU" dirty="0"/>
@@ -52811,7 +52800,7 @@
           <p:cNvPr id="5" name="Élőláb helye 4">
             <a:extLst>
               <a:ext uri="{FF2B5EF4-FFF2-40B4-BE49-F238E27FC236}">
-                <a16:creationId xmlns:a16="http://schemas.microsoft.com/office/drawing/2014/main" id="{1ED7D25D-51F0-4AAA-86C5-F3584C0E8A44}"/>
+                <a16:creationId xmlns:a16="http://schemas.microsoft.com/office/drawing/2014/main" id="{FFFF8DFC-D37E-4FE9-81F0-77C68D469526}"/>
               </a:ext>
             </a:extLst>
           </p:cNvPr>
@@ -52841,7 +52830,7 @@
           <p:cNvPr id="4" name="Dátum helye 3">
             <a:extLst>
               <a:ext uri="{FF2B5EF4-FFF2-40B4-BE49-F238E27FC236}">
-                <a16:creationId xmlns:a16="http://schemas.microsoft.com/office/drawing/2014/main" id="{F48CF653-A1E7-473E-A717-8659C5E457A1}"/>
+                <a16:creationId xmlns:a16="http://schemas.microsoft.com/office/drawing/2014/main" id="{0BA396AE-BE46-43FB-B4E7-224D2AF39F83}"/>
               </a:ext>
             </a:extLst>
           </p:cNvPr>
@@ -52869,7 +52858,7 @@
     </p:spTree>
     <p:extLst>
       <p:ext uri="{BB962C8B-B14F-4D97-AF65-F5344CB8AC3E}">
-        <p14:creationId xmlns:p14="http://schemas.microsoft.com/office/powerpoint/2010/main" val="4080312334"/>
+        <p14:creationId xmlns:p14="http://schemas.microsoft.com/office/powerpoint/2010/main" val="1728754232"/>
       </p:ext>
     </p:extLst>
   </p:cSld>
@@ -52905,7 +52894,7 @@
       </p:grpSpPr>
       <p:pic>
         <p:nvPicPr>
-          <p:cNvPr id="17" name="Kép helyőrzője 16" descr="Céges embléma">
+          <p:cNvPr id="17" name="Kép helyőrzője 16">
             <a:extLst>
               <a:ext uri="{FF2B5EF4-FFF2-40B4-BE49-F238E27FC236}">
                 <a16:creationId xmlns:a16="http://schemas.microsoft.com/office/drawing/2014/main" id="{D652F905-B33B-4D47-80C8-0F74935D9B8E}"/>
@@ -52925,17 +52914,18 @@
               <a:ext uri="{28A0092B-C50C-407E-A947-70E740481C1C}">
                 <a14:useLocalDpi xmlns:a14="http://schemas.microsoft.com/office/drawing/2010/main" val="0"/>
               </a:ext>
-              <a:ext uri="{96DAC541-7B7A-43D3-8B79-37D633B846F1}">
-                <asvg:svgBlip xmlns="" xmlns:asvg="http://schemas.microsoft.com/office/drawing/2016/SVG/main" r:embed="rId4"/>
-              </a:ext>
             </a:extLst>
           </a:blip>
-          <a:srcRect/>
           <a:stretch>
             <a:fillRect/>
           </a:stretch>
         </p:blipFill>
-        <p:spPr/>
+        <p:spPr>
+          <a:xfrm>
+            <a:off x="0" y="0"/>
+            <a:ext cx="1328400" cy="1328400"/>
+          </a:xfrm>
+        </p:spPr>
       </p:pic>
       <p:sp>
         <p:nvSpPr>
@@ -54015,7 +54005,7 @@
       </p:grpSpPr>
       <p:pic>
         <p:nvPicPr>
-          <p:cNvPr id="20" name="Kép helyőrzője 19" descr="Céges embléma">
+          <p:cNvPr id="20" name="Kép helyőrzője 19">
             <a:extLst>
               <a:ext uri="{FF2B5EF4-FFF2-40B4-BE49-F238E27FC236}">
                 <a16:creationId xmlns:a16="http://schemas.microsoft.com/office/drawing/2014/main" id="{E4C80877-D542-4201-A994-0186BAAB8419}"/>
@@ -54035,17 +54025,18 @@
               <a:ext uri="{28A0092B-C50C-407E-A947-70E740481C1C}">
                 <a14:useLocalDpi xmlns:a14="http://schemas.microsoft.com/office/drawing/2010/main" val="0"/>
               </a:ext>
-              <a:ext uri="{96DAC541-7B7A-43D3-8B79-37D633B846F1}">
-                <asvg:svgBlip xmlns="" xmlns:asvg="http://schemas.microsoft.com/office/drawing/2016/SVG/main" r:embed="rId4"/>
-              </a:ext>
             </a:extLst>
           </a:blip>
-          <a:srcRect/>
           <a:stretch>
             <a:fillRect/>
           </a:stretch>
         </p:blipFill>
-        <p:spPr/>
+        <p:spPr>
+          <a:xfrm>
+            <a:off x="0" y="9268"/>
+            <a:ext cx="1328400" cy="1328400"/>
+          </a:xfrm>
+        </p:spPr>
       </p:pic>
       <p:sp>
         <p:nvSpPr>

</xml_diff>

<commit_message>
ppt program leírás megkezdése
</commit_message>
<xml_diff>
--- a/documentation/PPT/TerFelSzoft.pptx
+++ b/documentation/PPT/TerFelSzoft.pptx
@@ -31638,7 +31638,7 @@
             <a:blip r:embed="rId2">
               <a:extLst>
                 <a:ext uri="{96DAC541-7B7A-43D3-8B79-37D633B846F1}">
-                  <asvg:svgBlip xmlns:asvg="http://schemas.microsoft.com/office/drawing/2016/SVG/main" xmlns="" r:embed="rId3"/>
+                  <asvg:svgBlip xmlns="" xmlns:asvg="http://schemas.microsoft.com/office/drawing/2016/SVG/main" r:embed="rId3"/>
                 </a:ext>
               </a:extLst>
             </a:blip>
@@ -42175,7 +42175,7 @@
             <a:blip r:embed="rId2">
               <a:extLst>
                 <a:ext uri="{96DAC541-7B7A-43D3-8B79-37D633B846F1}">
-                  <asvg:svgBlip xmlns:asvg="http://schemas.microsoft.com/office/drawing/2016/SVG/main" xmlns="" r:embed="rId3"/>
+                  <asvg:svgBlip xmlns="" xmlns:asvg="http://schemas.microsoft.com/office/drawing/2016/SVG/main" r:embed="rId3"/>
                 </a:ext>
               </a:extLst>
             </a:blip>
@@ -46551,15 +46551,7 @@
             <a:pPr rtl="0"/>
             <a:r>
               <a:rPr lang="hu-HU" dirty="0" err="1" smtClean="0"/>
-              <a:t>Angelica</a:t>
-            </a:r>
-            <a:r>
-              <a:rPr lang="hu-HU" dirty="0" smtClean="0"/>
-              <a:t> </a:t>
-            </a:r>
-            <a:r>
-              <a:rPr lang="hu-HU" dirty="0" err="1" smtClean="0"/>
-              <a:t>Astrom</a:t>
+              <a:t>Woman</a:t>
             </a:r>
             <a:endParaRPr lang="hu-HU" dirty="0"/>
           </a:p>
@@ -46589,7 +46581,7 @@
             <a:pPr rtl="0"/>
             <a:r>
               <a:rPr lang="hu-HU" dirty="0" smtClean="0"/>
-              <a:t>Csapattag beosztása</a:t>
+              <a:t>Prosti</a:t>
             </a:r>
             <a:endParaRPr lang="hu-HU" dirty="0"/>
           </a:p>
@@ -46649,18 +46641,9 @@
           </a:bodyPr>
           <a:lstStyle/>
           <a:p>
-            <a:pPr rtl="0"/>
-            <a:r>
-              <a:rPr lang="hu-HU" dirty="0" err="1" smtClean="0"/>
-              <a:t>Ian</a:t>
-            </a:r>
-            <a:r>
-              <a:rPr lang="hu-HU" dirty="0" smtClean="0"/>
-              <a:t> </a:t>
-            </a:r>
-            <a:r>
-              <a:rPr lang="hu-HU" dirty="0" err="1" smtClean="0"/>
-              <a:t>Hansson</a:t>
+            <a:r>
+              <a:rPr lang="hu-HU" dirty="0"/>
+              <a:t>Szabó Péter</a:t>
             </a:r>
             <a:endParaRPr lang="hu-HU" dirty="0"/>
           </a:p>
@@ -46687,11 +46670,14 @@
           <a:bodyPr rtlCol="0"/>
           <a:lstStyle/>
           <a:p>
+            <a:r>
+              <a:rPr lang="hu-HU" dirty="0" smtClean="0"/>
+              <a:t>The Empire</a:t>
+            </a:r>
+            <a:endParaRPr lang="hu-HU" dirty="0"/>
+          </a:p>
+          <a:p>
             <a:pPr rtl="0"/>
-            <a:r>
-              <a:rPr lang="hu-HU" dirty="0" smtClean="0"/>
-              <a:t>Csapattag beosztása</a:t>
-            </a:r>
             <a:endParaRPr lang="hu-HU" dirty="0"/>
           </a:p>
         </p:txBody>
@@ -46752,16 +46738,8 @@
           <a:p>
             <a:pPr rtl="0"/>
             <a:r>
-              <a:rPr lang="hu-HU" dirty="0" err="1" smtClean="0"/>
-              <a:t>Jens</a:t>
-            </a:r>
-            <a:r>
               <a:rPr lang="hu-HU" dirty="0" smtClean="0"/>
-              <a:t> </a:t>
-            </a:r>
-            <a:r>
-              <a:rPr lang="hu-HU" dirty="0" err="1" smtClean="0"/>
-              <a:t>Martensson</a:t>
+              <a:t>Zámbó Illés</a:t>
             </a:r>
             <a:endParaRPr lang="hu-HU" dirty="0"/>
           </a:p>
@@ -46791,7 +46769,7 @@
             <a:pPr rtl="0"/>
             <a:r>
               <a:rPr lang="hu-HU" dirty="0" smtClean="0"/>
-              <a:t>Csapattag beosztása</a:t>
+              <a:t>Olcsó külföldi munkaerő</a:t>
             </a:r>
             <a:endParaRPr lang="hu-HU" dirty="0"/>
           </a:p>
@@ -46849,18 +46827,9 @@
           <a:bodyPr rtlCol="0"/>
           <a:lstStyle/>
           <a:p>
-            <a:pPr rtl="0"/>
-            <a:r>
-              <a:rPr lang="hu-HU" dirty="0" err="1" smtClean="0"/>
-              <a:t>Angelica</a:t>
-            </a:r>
-            <a:r>
-              <a:rPr lang="hu-HU" dirty="0" smtClean="0"/>
-              <a:t> </a:t>
-            </a:r>
-            <a:r>
-              <a:rPr lang="hu-HU" dirty="0" err="1" smtClean="0"/>
-              <a:t>Astrom</a:t>
+            <a:r>
+              <a:rPr lang="hu-HU" dirty="0" err="1"/>
+              <a:t>Woman</a:t>
             </a:r>
             <a:endParaRPr lang="hu-HU" dirty="0"/>
           </a:p>
@@ -46887,10 +46856,9 @@
           <a:bodyPr rtlCol="0"/>
           <a:lstStyle/>
           <a:p>
-            <a:pPr rtl="0"/>
-            <a:r>
-              <a:rPr lang="hu-HU" dirty="0" smtClean="0"/>
-              <a:t>Csapattag beosztása</a:t>
+            <a:r>
+              <a:rPr lang="hu-HU" dirty="0"/>
+              <a:t>Prosti</a:t>
             </a:r>
             <a:endParaRPr lang="hu-HU" dirty="0"/>
           </a:p>
@@ -46950,16 +46918,8 @@
           <a:p>
             <a:pPr rtl="0"/>
             <a:r>
-              <a:rPr lang="hu-HU" dirty="0" err="1" smtClean="0"/>
-              <a:t>Ian</a:t>
-            </a:r>
-            <a:r>
               <a:rPr lang="hu-HU" dirty="0" smtClean="0"/>
-              <a:t> </a:t>
-            </a:r>
-            <a:r>
-              <a:rPr lang="hu-HU" dirty="0" err="1" smtClean="0"/>
-              <a:t>Hansson</a:t>
+              <a:t>Szabó Péter</a:t>
             </a:r>
             <a:endParaRPr lang="hu-HU" dirty="0"/>
           </a:p>
@@ -46986,11 +46946,12 @@
           <a:bodyPr rtlCol="0"/>
           <a:lstStyle/>
           <a:p>
-            <a:pPr rtl="0"/>
-            <a:r>
-              <a:rPr lang="hu-HU" dirty="0" smtClean="0"/>
-              <a:t>Csapattag beosztása</a:t>
-            </a:r>
+            <a:r>
+              <a:rPr lang="hu-HU" dirty="0"/>
+              <a:t>The Empire</a:t>
+            </a:r>
+          </a:p>
+          <a:p>
             <a:endParaRPr lang="hu-HU" dirty="0"/>
           </a:p>
         </p:txBody>
@@ -47047,18 +47008,9 @@
           <a:bodyPr rtlCol="0"/>
           <a:lstStyle/>
           <a:p>
-            <a:pPr rtl="0"/>
-            <a:r>
-              <a:rPr lang="hu-HU" dirty="0" err="1" smtClean="0"/>
-              <a:t>Jens</a:t>
-            </a:r>
-            <a:r>
-              <a:rPr lang="hu-HU" dirty="0" smtClean="0"/>
-              <a:t> </a:t>
-            </a:r>
-            <a:r>
-              <a:rPr lang="hu-HU" dirty="0" err="1" smtClean="0"/>
-              <a:t>Martensson</a:t>
+            <a:r>
+              <a:rPr lang="hu-HU" dirty="0"/>
+              <a:t>Zámbó Illés</a:t>
             </a:r>
             <a:endParaRPr lang="hu-HU" dirty="0"/>
           </a:p>
@@ -47085,10 +47037,9 @@
           <a:bodyPr rtlCol="0"/>
           <a:lstStyle/>
           <a:p>
-            <a:pPr rtl="0"/>
-            <a:r>
-              <a:rPr lang="hu-HU" dirty="0" smtClean="0"/>
-              <a:t>Csapattag beosztása</a:t>
+            <a:r>
+              <a:rPr lang="hu-HU" dirty="0"/>
+              <a:t>Olcsó külföldi munkaerő</a:t>
             </a:r>
             <a:endParaRPr lang="hu-HU" dirty="0"/>
           </a:p>
@@ -51025,6 +50976,10 @@
           <a:lstStyle/>
           <a:p>
             <a:pPr rtl="0"/>
+            <a:r>
+              <a:rPr lang="hu-HU" dirty="0" smtClean="0"/>
+              <a:t>Működés</a:t>
+            </a:r>
             <a:endParaRPr lang="hu-HU" dirty="0"/>
           </a:p>
         </p:txBody>
@@ -51052,395 +51007,26 @@
           <a:p>
             <a:pPr rtl="0"/>
             <a:r>
-              <a:rPr lang="hu-HU" dirty="0" err="1" smtClean="0"/>
-              <a:t>Lorem</a:t>
-            </a:r>
-            <a:r>
               <a:rPr lang="hu-HU" dirty="0" smtClean="0"/>
-              <a:t> </a:t>
-            </a:r>
-            <a:r>
-              <a:rPr lang="hu-HU" dirty="0" err="1" smtClean="0"/>
-              <a:t>ipsum</a:t>
-            </a:r>
+              <a:t>Működik (nem) (-;</a:t>
+            </a:r>
+            <a:endParaRPr lang="hu-HU" dirty="0" smtClean="0"/>
+          </a:p>
+          <a:p>
+            <a:pPr rtl="0"/>
             <a:r>
               <a:rPr lang="hu-HU" dirty="0" smtClean="0"/>
-              <a:t> </a:t>
-            </a:r>
-            <a:r>
-              <a:rPr lang="hu-HU" dirty="0" err="1" smtClean="0"/>
-              <a:t>dolor</a:t>
-            </a:r>
+              <a:t>A program megvizsgálja melyik test van kiválasztva és ahhoz igazítja a szövegeket</a:t>
+            </a:r>
+            <a:endParaRPr lang="hu-HU" dirty="0" smtClean="0"/>
+          </a:p>
+          <a:p>
+            <a:pPr rtl="0"/>
             <a:r>
               <a:rPr lang="hu-HU" dirty="0" smtClean="0"/>
-              <a:t> </a:t>
-            </a:r>
-            <a:r>
-              <a:rPr lang="hu-HU" dirty="0" err="1" smtClean="0"/>
-              <a:t>sit</a:t>
-            </a:r>
-            <a:r>
-              <a:rPr lang="hu-HU" dirty="0" smtClean="0"/>
-              <a:t> </a:t>
-            </a:r>
-            <a:r>
-              <a:rPr lang="hu-HU" dirty="0" err="1" smtClean="0"/>
-              <a:t>amet</a:t>
-            </a:r>
-            <a:r>
-              <a:rPr lang="hu-HU" dirty="0" smtClean="0"/>
-              <a:t>, </a:t>
-            </a:r>
-            <a:r>
-              <a:rPr lang="hu-HU" dirty="0" err="1" smtClean="0"/>
-              <a:t>consectetuer</a:t>
-            </a:r>
-            <a:r>
-              <a:rPr lang="hu-HU" dirty="0" smtClean="0"/>
-              <a:t> </a:t>
-            </a:r>
-            <a:r>
-              <a:rPr lang="hu-HU" dirty="0" err="1" smtClean="0"/>
-              <a:t>adipiscing</a:t>
-            </a:r>
-            <a:r>
-              <a:rPr lang="hu-HU" dirty="0" smtClean="0"/>
-              <a:t> elit. Maecenas </a:t>
-            </a:r>
-            <a:r>
-              <a:rPr lang="hu-HU" dirty="0" err="1" smtClean="0"/>
-              <a:t>porttitor</a:t>
-            </a:r>
-            <a:r>
-              <a:rPr lang="hu-HU" dirty="0" smtClean="0"/>
-              <a:t> </a:t>
-            </a:r>
-            <a:r>
-              <a:rPr lang="hu-HU" dirty="0" err="1" smtClean="0"/>
-              <a:t>congue</a:t>
-            </a:r>
-            <a:r>
-              <a:rPr lang="hu-HU" dirty="0" smtClean="0"/>
-              <a:t> </a:t>
-            </a:r>
-            <a:r>
-              <a:rPr lang="hu-HU" dirty="0" err="1" smtClean="0"/>
-              <a:t>massa</a:t>
-            </a:r>
-            <a:r>
-              <a:rPr lang="hu-HU" dirty="0" smtClean="0"/>
-              <a:t>. </a:t>
-            </a:r>
-            <a:r>
-              <a:rPr lang="hu-HU" dirty="0" err="1" smtClean="0"/>
-              <a:t>Fusce</a:t>
-            </a:r>
-            <a:r>
-              <a:rPr lang="hu-HU" dirty="0" smtClean="0"/>
-              <a:t> </a:t>
-            </a:r>
-            <a:r>
-              <a:rPr lang="hu-HU" dirty="0" err="1" smtClean="0"/>
-              <a:t>posuere</a:t>
-            </a:r>
-            <a:r>
-              <a:rPr lang="hu-HU" dirty="0" smtClean="0"/>
-              <a:t>, </a:t>
-            </a:r>
-            <a:r>
-              <a:rPr lang="hu-HU" dirty="0" err="1" smtClean="0"/>
-              <a:t>magna</a:t>
-            </a:r>
-            <a:r>
-              <a:rPr lang="hu-HU" dirty="0" smtClean="0"/>
-              <a:t> </a:t>
-            </a:r>
-            <a:r>
-              <a:rPr lang="hu-HU" dirty="0" err="1" smtClean="0"/>
-              <a:t>sed</a:t>
-            </a:r>
-            <a:r>
-              <a:rPr lang="hu-HU" dirty="0" smtClean="0"/>
-              <a:t> </a:t>
-            </a:r>
-            <a:r>
-              <a:rPr lang="hu-HU" dirty="0" err="1" smtClean="0"/>
-              <a:t>pulvinar</a:t>
-            </a:r>
-            <a:r>
-              <a:rPr lang="hu-HU" dirty="0" smtClean="0"/>
-              <a:t> </a:t>
-            </a:r>
-            <a:r>
-              <a:rPr lang="hu-HU" dirty="0" err="1" smtClean="0"/>
-              <a:t>ultricies</a:t>
-            </a:r>
-            <a:r>
-              <a:rPr lang="hu-HU" dirty="0" smtClean="0"/>
-              <a:t>, </a:t>
-            </a:r>
-            <a:r>
-              <a:rPr lang="hu-HU" dirty="0" err="1" smtClean="0"/>
-              <a:t>purus</a:t>
-            </a:r>
-            <a:r>
-              <a:rPr lang="hu-HU" dirty="0" smtClean="0"/>
-              <a:t> </a:t>
-            </a:r>
-            <a:r>
-              <a:rPr lang="hu-HU" dirty="0" err="1" smtClean="0"/>
-              <a:t>lectus</a:t>
-            </a:r>
-            <a:r>
-              <a:rPr lang="hu-HU" dirty="0" smtClean="0"/>
-              <a:t> </a:t>
-            </a:r>
-            <a:r>
-              <a:rPr lang="hu-HU" dirty="0" err="1" smtClean="0"/>
-              <a:t>malesuada</a:t>
-            </a:r>
-            <a:r>
-              <a:rPr lang="hu-HU" dirty="0" smtClean="0"/>
-              <a:t> </a:t>
-            </a:r>
-            <a:r>
-              <a:rPr lang="hu-HU" dirty="0" err="1" smtClean="0"/>
-              <a:t>libero</a:t>
-            </a:r>
-            <a:r>
-              <a:rPr lang="hu-HU" dirty="0" smtClean="0"/>
-              <a:t>, </a:t>
-            </a:r>
-            <a:r>
-              <a:rPr lang="hu-HU" dirty="0" err="1" smtClean="0"/>
-              <a:t>sit</a:t>
-            </a:r>
-            <a:r>
-              <a:rPr lang="hu-HU" dirty="0" smtClean="0"/>
-              <a:t> </a:t>
-            </a:r>
-            <a:r>
-              <a:rPr lang="hu-HU" dirty="0" err="1" smtClean="0"/>
-              <a:t>amet</a:t>
-            </a:r>
-            <a:r>
-              <a:rPr lang="hu-HU" dirty="0" smtClean="0"/>
-              <a:t> </a:t>
-            </a:r>
-            <a:r>
-              <a:rPr lang="hu-HU" dirty="0" err="1" smtClean="0"/>
-              <a:t>commodo</a:t>
-            </a:r>
-            <a:r>
-              <a:rPr lang="hu-HU" dirty="0" smtClean="0"/>
-              <a:t> </a:t>
-            </a:r>
-            <a:r>
-              <a:rPr lang="hu-HU" dirty="0" err="1" smtClean="0"/>
-              <a:t>magna</a:t>
-            </a:r>
-            <a:r>
-              <a:rPr lang="hu-HU" dirty="0" smtClean="0"/>
-              <a:t> </a:t>
-            </a:r>
-            <a:r>
-              <a:rPr lang="hu-HU" dirty="0" err="1" smtClean="0"/>
-              <a:t>eros</a:t>
-            </a:r>
-            <a:r>
-              <a:rPr lang="hu-HU" dirty="0" smtClean="0"/>
-              <a:t> </a:t>
-            </a:r>
-            <a:r>
-              <a:rPr lang="hu-HU" dirty="0" err="1" smtClean="0"/>
-              <a:t>quis</a:t>
-            </a:r>
-            <a:r>
-              <a:rPr lang="hu-HU" dirty="0" smtClean="0"/>
-              <a:t> urna.</a:t>
-            </a:r>
-          </a:p>
-          <a:p>
-            <a:pPr rtl="0"/>
-            <a:r>
-              <a:rPr lang="hu-HU" dirty="0" err="1" smtClean="0"/>
-              <a:t>Nunc</a:t>
-            </a:r>
-            <a:r>
-              <a:rPr lang="hu-HU" dirty="0" smtClean="0"/>
-              <a:t> </a:t>
-            </a:r>
-            <a:r>
-              <a:rPr lang="hu-HU" dirty="0" err="1" smtClean="0"/>
-              <a:t>viverra</a:t>
-            </a:r>
-            <a:r>
-              <a:rPr lang="hu-HU" dirty="0" smtClean="0"/>
-              <a:t> </a:t>
-            </a:r>
-            <a:r>
-              <a:rPr lang="hu-HU" dirty="0" err="1" smtClean="0"/>
-              <a:t>imperdiet</a:t>
-            </a:r>
-            <a:r>
-              <a:rPr lang="hu-HU" dirty="0" smtClean="0"/>
-              <a:t> </a:t>
-            </a:r>
-            <a:r>
-              <a:rPr lang="hu-HU" dirty="0" err="1" smtClean="0"/>
-              <a:t>enim</a:t>
-            </a:r>
-            <a:r>
-              <a:rPr lang="hu-HU" dirty="0" smtClean="0"/>
-              <a:t>. </a:t>
-            </a:r>
-            <a:r>
-              <a:rPr lang="hu-HU" dirty="0" err="1" smtClean="0"/>
-              <a:t>Fusce</a:t>
-            </a:r>
-            <a:r>
-              <a:rPr lang="hu-HU" dirty="0" smtClean="0"/>
-              <a:t> est. </a:t>
-            </a:r>
-            <a:r>
-              <a:rPr lang="hu-HU" dirty="0" err="1" smtClean="0"/>
-              <a:t>Vivamus</a:t>
-            </a:r>
-            <a:r>
-              <a:rPr lang="hu-HU" dirty="0" smtClean="0"/>
-              <a:t> a </a:t>
-            </a:r>
-            <a:r>
-              <a:rPr lang="hu-HU" dirty="0" err="1" smtClean="0"/>
-              <a:t>tellus</a:t>
-            </a:r>
-            <a:r>
-              <a:rPr lang="hu-HU" dirty="0" smtClean="0"/>
-              <a:t>.</a:t>
-            </a:r>
-          </a:p>
-          <a:p>
-            <a:pPr rtl="0"/>
-            <a:r>
-              <a:rPr lang="hu-HU" dirty="0" err="1" smtClean="0"/>
-              <a:t>Pellentesque</a:t>
-            </a:r>
-            <a:r>
-              <a:rPr lang="hu-HU" dirty="0" smtClean="0"/>
-              <a:t> habitant </a:t>
-            </a:r>
-            <a:r>
-              <a:rPr lang="hu-HU" dirty="0" err="1" smtClean="0"/>
-              <a:t>morbi</a:t>
-            </a:r>
-            <a:r>
-              <a:rPr lang="hu-HU" dirty="0" smtClean="0"/>
-              <a:t> </a:t>
-            </a:r>
-            <a:r>
-              <a:rPr lang="hu-HU" dirty="0" err="1" smtClean="0"/>
-              <a:t>tristique</a:t>
-            </a:r>
-            <a:r>
-              <a:rPr lang="hu-HU" dirty="0" smtClean="0"/>
-              <a:t> </a:t>
-            </a:r>
-            <a:r>
-              <a:rPr lang="hu-HU" dirty="0" err="1" smtClean="0"/>
-              <a:t>senectus</a:t>
-            </a:r>
-            <a:r>
-              <a:rPr lang="hu-HU" dirty="0" smtClean="0"/>
-              <a:t> et </a:t>
-            </a:r>
-            <a:r>
-              <a:rPr lang="hu-HU" dirty="0" err="1" smtClean="0"/>
-              <a:t>netus</a:t>
-            </a:r>
-            <a:r>
-              <a:rPr lang="hu-HU" dirty="0" smtClean="0"/>
-              <a:t> et </a:t>
-            </a:r>
-            <a:r>
-              <a:rPr lang="hu-HU" dirty="0" err="1" smtClean="0"/>
-              <a:t>malesuada</a:t>
-            </a:r>
-            <a:r>
-              <a:rPr lang="hu-HU" dirty="0" smtClean="0"/>
-              <a:t> </a:t>
-            </a:r>
-            <a:r>
-              <a:rPr lang="hu-HU" dirty="0" err="1" smtClean="0"/>
-              <a:t>fames</a:t>
-            </a:r>
-            <a:r>
-              <a:rPr lang="hu-HU" dirty="0" smtClean="0"/>
-              <a:t> </a:t>
-            </a:r>
-            <a:r>
-              <a:rPr lang="hu-HU" dirty="0" err="1" smtClean="0"/>
-              <a:t>ac</a:t>
-            </a:r>
-            <a:r>
-              <a:rPr lang="hu-HU" dirty="0" smtClean="0"/>
-              <a:t> turpis </a:t>
-            </a:r>
-            <a:r>
-              <a:rPr lang="hu-HU" dirty="0" err="1" smtClean="0"/>
-              <a:t>egestas</a:t>
-            </a:r>
-            <a:r>
-              <a:rPr lang="hu-HU" dirty="0" smtClean="0"/>
-              <a:t>. </a:t>
-            </a:r>
-            <a:r>
-              <a:rPr lang="hu-HU" dirty="0" err="1" smtClean="0"/>
-              <a:t>Proin</a:t>
-            </a:r>
-            <a:r>
-              <a:rPr lang="hu-HU" dirty="0" smtClean="0"/>
-              <a:t> </a:t>
-            </a:r>
-            <a:r>
-              <a:rPr lang="hu-HU" dirty="0" err="1" smtClean="0"/>
-              <a:t>pharetra</a:t>
-            </a:r>
-            <a:r>
-              <a:rPr lang="hu-HU" dirty="0" smtClean="0"/>
-              <a:t> </a:t>
-            </a:r>
-            <a:r>
-              <a:rPr lang="hu-HU" dirty="0" err="1" smtClean="0"/>
-              <a:t>nonummy</a:t>
-            </a:r>
-            <a:r>
-              <a:rPr lang="hu-HU" dirty="0" smtClean="0"/>
-              <a:t> </a:t>
-            </a:r>
-            <a:r>
-              <a:rPr lang="hu-HU" dirty="0" err="1" smtClean="0"/>
-              <a:t>pede</a:t>
-            </a:r>
-            <a:r>
-              <a:rPr lang="hu-HU" dirty="0" smtClean="0"/>
-              <a:t>. </a:t>
-            </a:r>
-            <a:r>
-              <a:rPr lang="hu-HU" dirty="0" err="1" smtClean="0"/>
-              <a:t>Mauris</a:t>
-            </a:r>
-            <a:r>
-              <a:rPr lang="hu-HU" dirty="0" smtClean="0"/>
-              <a:t> et </a:t>
-            </a:r>
-            <a:r>
-              <a:rPr lang="hu-HU" dirty="0" err="1" smtClean="0"/>
-              <a:t>orci</a:t>
-            </a:r>
-            <a:r>
-              <a:rPr lang="hu-HU" dirty="0" smtClean="0"/>
-              <a:t>.</a:t>
-            </a:r>
+              <a:t>Nem megadott vagy hibás adatok esetében figyelmezteti egy felugró ablakkal a felhasználót</a:t>
+            </a:r>
+            <a:endParaRPr lang="hu-HU" dirty="0" smtClean="0"/>
           </a:p>
           <a:p>
             <a:pPr rtl="0"/>
@@ -51731,273 +51317,32 @@
         <p:spPr/>
         <p:txBody>
           <a:bodyPr rtlCol="0">
-            <a:normAutofit fontScale="92500" lnSpcReduction="10000"/>
+            <a:normAutofit/>
           </a:bodyPr>
           <a:lstStyle/>
           <a:p>
             <a:pPr rtl="0"/>
             <a:r>
-              <a:rPr lang="hu-HU" dirty="0" err="1" smtClean="0"/>
-              <a:t>Lorem</a:t>
-            </a:r>
-            <a:r>
               <a:rPr lang="hu-HU" dirty="0" smtClean="0"/>
-              <a:t> </a:t>
-            </a:r>
-            <a:r>
-              <a:rPr lang="hu-HU" dirty="0" err="1" smtClean="0"/>
-              <a:t>ipsum</a:t>
-            </a:r>
+              <a:t>A kiválasztott test illusztrálva van</a:t>
+            </a:r>
+            <a:endParaRPr lang="hu-HU" dirty="0" smtClean="0"/>
+          </a:p>
+          <a:p>
+            <a:pPr rtl="0"/>
             <a:r>
               <a:rPr lang="hu-HU" dirty="0" smtClean="0"/>
-              <a:t> </a:t>
-            </a:r>
-            <a:r>
-              <a:rPr lang="hu-HU" dirty="0" err="1" smtClean="0"/>
-              <a:t>dolor</a:t>
-            </a:r>
+              <a:t>Előzmények</a:t>
+            </a:r>
+            <a:endParaRPr lang="hu-HU" dirty="0" smtClean="0"/>
+          </a:p>
+          <a:p>
+            <a:pPr rtl="0"/>
             <a:r>
               <a:rPr lang="hu-HU" dirty="0" smtClean="0"/>
-              <a:t> </a:t>
-            </a:r>
-            <a:r>
-              <a:rPr lang="hu-HU" dirty="0" err="1" smtClean="0"/>
-              <a:t>sit</a:t>
-            </a:r>
-            <a:r>
-              <a:rPr lang="hu-HU" dirty="0" smtClean="0"/>
-              <a:t> </a:t>
-            </a:r>
-            <a:r>
-              <a:rPr lang="hu-HU" dirty="0" err="1" smtClean="0"/>
-              <a:t>amet</a:t>
-            </a:r>
-            <a:r>
-              <a:rPr lang="hu-HU" dirty="0" smtClean="0"/>
-              <a:t>, </a:t>
-            </a:r>
-            <a:r>
-              <a:rPr lang="hu-HU" dirty="0" err="1" smtClean="0"/>
-              <a:t>consectetuer</a:t>
-            </a:r>
-            <a:r>
-              <a:rPr lang="hu-HU" dirty="0" smtClean="0"/>
-              <a:t> </a:t>
-            </a:r>
-            <a:r>
-              <a:rPr lang="hu-HU" dirty="0" err="1" smtClean="0"/>
-              <a:t>adipiscing</a:t>
-            </a:r>
-            <a:r>
-              <a:rPr lang="hu-HU" dirty="0" smtClean="0"/>
-              <a:t> elit. Maecenas </a:t>
-            </a:r>
-            <a:r>
-              <a:rPr lang="hu-HU" dirty="0" err="1" smtClean="0"/>
-              <a:t>porttitor</a:t>
-            </a:r>
-            <a:r>
-              <a:rPr lang="hu-HU" dirty="0" smtClean="0"/>
-              <a:t> </a:t>
-            </a:r>
-            <a:r>
-              <a:rPr lang="hu-HU" dirty="0" err="1" smtClean="0"/>
-              <a:t>congue</a:t>
-            </a:r>
-            <a:r>
-              <a:rPr lang="hu-HU" dirty="0" smtClean="0"/>
-              <a:t> </a:t>
-            </a:r>
-            <a:r>
-              <a:rPr lang="hu-HU" dirty="0" err="1" smtClean="0"/>
-              <a:t>massa</a:t>
-            </a:r>
-            <a:r>
-              <a:rPr lang="hu-HU" dirty="0" smtClean="0"/>
-              <a:t>. </a:t>
-            </a:r>
-          </a:p>
-          <a:p>
-            <a:pPr rtl="0"/>
-            <a:r>
-              <a:rPr lang="hu-HU" dirty="0" err="1" smtClean="0"/>
-              <a:t>Nunc</a:t>
-            </a:r>
-            <a:r>
-              <a:rPr lang="hu-HU" dirty="0" smtClean="0"/>
-              <a:t> </a:t>
-            </a:r>
-            <a:r>
-              <a:rPr lang="hu-HU" dirty="0" err="1" smtClean="0"/>
-              <a:t>viverra</a:t>
-            </a:r>
-            <a:r>
-              <a:rPr lang="hu-HU" dirty="0" smtClean="0"/>
-              <a:t> </a:t>
-            </a:r>
-            <a:r>
-              <a:rPr lang="hu-HU" dirty="0" err="1" smtClean="0"/>
-              <a:t>imperdiet</a:t>
-            </a:r>
-            <a:r>
-              <a:rPr lang="hu-HU" dirty="0" smtClean="0"/>
-              <a:t> </a:t>
-            </a:r>
-            <a:r>
-              <a:rPr lang="hu-HU" dirty="0" err="1" smtClean="0"/>
-              <a:t>enim</a:t>
-            </a:r>
-            <a:r>
-              <a:rPr lang="hu-HU" dirty="0" smtClean="0"/>
-              <a:t>. </a:t>
-            </a:r>
-            <a:r>
-              <a:rPr lang="hu-HU" dirty="0" err="1" smtClean="0"/>
-              <a:t>Fusce</a:t>
-            </a:r>
-            <a:r>
-              <a:rPr lang="hu-HU" dirty="0" smtClean="0"/>
-              <a:t> est. </a:t>
-            </a:r>
-            <a:r>
-              <a:rPr lang="hu-HU" dirty="0" err="1" smtClean="0"/>
-              <a:t>Vivamus</a:t>
-            </a:r>
-            <a:r>
-              <a:rPr lang="hu-HU" dirty="0" smtClean="0"/>
-              <a:t> a </a:t>
-            </a:r>
-            <a:r>
-              <a:rPr lang="hu-HU" dirty="0" err="1" smtClean="0"/>
-              <a:t>tellus</a:t>
-            </a:r>
-            <a:r>
-              <a:rPr lang="hu-HU" dirty="0" smtClean="0"/>
-              <a:t>.</a:t>
-            </a:r>
-          </a:p>
-          <a:p>
-            <a:pPr rtl="0"/>
-            <a:r>
-              <a:rPr lang="hu-HU" dirty="0" err="1" smtClean="0"/>
-              <a:t>Pellentesque</a:t>
-            </a:r>
-            <a:r>
-              <a:rPr lang="hu-HU" dirty="0" smtClean="0"/>
-              <a:t> habitant </a:t>
-            </a:r>
-            <a:r>
-              <a:rPr lang="hu-HU" dirty="0" err="1" smtClean="0"/>
-              <a:t>morbi</a:t>
-            </a:r>
-            <a:r>
-              <a:rPr lang="hu-HU" dirty="0" smtClean="0"/>
-              <a:t> </a:t>
-            </a:r>
-            <a:r>
-              <a:rPr lang="hu-HU" dirty="0" err="1" smtClean="0"/>
-              <a:t>tristique</a:t>
-            </a:r>
-            <a:r>
-              <a:rPr lang="hu-HU" dirty="0" smtClean="0"/>
-              <a:t> </a:t>
-            </a:r>
-            <a:r>
-              <a:rPr lang="hu-HU" dirty="0" err="1" smtClean="0"/>
-              <a:t>senectus</a:t>
-            </a:r>
-            <a:r>
-              <a:rPr lang="hu-HU" dirty="0" smtClean="0"/>
-              <a:t> et </a:t>
-            </a:r>
-            <a:r>
-              <a:rPr lang="hu-HU" dirty="0" err="1" smtClean="0"/>
-              <a:t>netus</a:t>
-            </a:r>
-            <a:r>
-              <a:rPr lang="hu-HU" dirty="0" smtClean="0"/>
-              <a:t> et </a:t>
-            </a:r>
-            <a:r>
-              <a:rPr lang="hu-HU" dirty="0" err="1" smtClean="0"/>
-              <a:t>malesuada</a:t>
-            </a:r>
-            <a:r>
-              <a:rPr lang="hu-HU" dirty="0" smtClean="0"/>
-              <a:t> </a:t>
-            </a:r>
-            <a:r>
-              <a:rPr lang="hu-HU" dirty="0" err="1" smtClean="0"/>
-              <a:t>fames</a:t>
-            </a:r>
-            <a:r>
-              <a:rPr lang="hu-HU" dirty="0" smtClean="0"/>
-              <a:t> </a:t>
-            </a:r>
-            <a:r>
-              <a:rPr lang="hu-HU" dirty="0" err="1" smtClean="0"/>
-              <a:t>ac</a:t>
-            </a:r>
-            <a:r>
-              <a:rPr lang="hu-HU" dirty="0" smtClean="0"/>
-              <a:t> turpis </a:t>
-            </a:r>
-            <a:r>
-              <a:rPr lang="hu-HU" dirty="0" err="1" smtClean="0"/>
-              <a:t>egestas</a:t>
-            </a:r>
-            <a:r>
-              <a:rPr lang="hu-HU" dirty="0" smtClean="0"/>
-              <a:t>. </a:t>
-            </a:r>
-            <a:r>
-              <a:rPr lang="hu-HU" dirty="0" err="1" smtClean="0"/>
-              <a:t>Proin</a:t>
-            </a:r>
-            <a:r>
-              <a:rPr lang="hu-HU" dirty="0" smtClean="0"/>
-              <a:t> </a:t>
-            </a:r>
-            <a:r>
-              <a:rPr lang="hu-HU" dirty="0" err="1" smtClean="0"/>
-              <a:t>pharetra</a:t>
-            </a:r>
-            <a:r>
-              <a:rPr lang="hu-HU" dirty="0" smtClean="0"/>
-              <a:t> </a:t>
-            </a:r>
-            <a:r>
-              <a:rPr lang="hu-HU" dirty="0" err="1" smtClean="0"/>
-              <a:t>nonummy</a:t>
-            </a:r>
-            <a:r>
-              <a:rPr lang="hu-HU" dirty="0" smtClean="0"/>
-              <a:t> </a:t>
-            </a:r>
-            <a:r>
-              <a:rPr lang="hu-HU" dirty="0" err="1" smtClean="0"/>
-              <a:t>pede</a:t>
-            </a:r>
-            <a:r>
-              <a:rPr lang="hu-HU" dirty="0" smtClean="0"/>
-              <a:t>. </a:t>
-            </a:r>
-            <a:r>
-              <a:rPr lang="hu-HU" dirty="0" err="1" smtClean="0"/>
-              <a:t>Mauris</a:t>
-            </a:r>
-            <a:r>
-              <a:rPr lang="hu-HU" dirty="0" smtClean="0"/>
-              <a:t> et </a:t>
-            </a:r>
-            <a:r>
-              <a:rPr lang="hu-HU" dirty="0" err="1" smtClean="0"/>
-              <a:t>orci</a:t>
-            </a:r>
-            <a:r>
-              <a:rPr lang="hu-HU" dirty="0" smtClean="0"/>
-              <a:t>.</a:t>
-            </a:r>
+              <a:t>Szünetmentes számítás</a:t>
+            </a:r>
+            <a:endParaRPr lang="hu-HU" dirty="0" smtClean="0"/>
           </a:p>
           <a:p>
             <a:pPr rtl="0"/>
@@ -52959,15 +52304,7 @@
             <a:pPr algn="just" rtl="0"/>
             <a:r>
               <a:rPr lang="hu-HU" dirty="0" smtClean="0"/>
-              <a:t>Először megterveztük a weboldalt és a programot. Elsősorban a grafikai design-t egyaránt a programnál és weboldalnál</a:t>
-            </a:r>
-            <a:r>
-              <a:rPr lang="hu-HU" dirty="0" smtClean="0"/>
-              <a:t>. </a:t>
-            </a:r>
-            <a:r>
-              <a:rPr lang="hu-HU" dirty="0" smtClean="0"/>
-              <a:t>Az egész dokumentálva </a:t>
+              <a:t>Először megterveztük a weboldalt és a programot. Elsősorban a grafikai design-t egyaránt a programnál és weboldalnál. Az egész dokumentálva </a:t>
             </a:r>
             <a:r>
               <a:rPr lang="hu-HU" sz="1500" dirty="0" smtClean="0"/>
@@ -52977,7 +52314,6 @@
               <a:rPr lang="hu-HU" dirty="0" smtClean="0"/>
               <a:t>.</a:t>
             </a:r>
-            <a:endParaRPr lang="hu-HU" dirty="0" smtClean="0"/>
           </a:p>
         </p:txBody>
       </p:sp>
@@ -53080,11 +52416,7 @@
             <a:pPr algn="just"/>
             <a:r>
               <a:rPr lang="hu-HU" dirty="0" smtClean="0"/>
-              <a:t>A tervezés után megkezdtük a fejlesztést. </a:t>
-            </a:r>
-            <a:r>
-              <a:rPr lang="hu-HU" dirty="0" smtClean="0"/>
-              <a:t>A fejlesztés alatt elkészült maga a program és a hozzátartozó </a:t>
+              <a:t>A tervezés után megkezdtük a fejlesztést. A fejlesztés alatt elkészült maga a program és a hozzátartozó </a:t>
             </a:r>
             <a:r>
               <a:rPr lang="hu-HU" dirty="0"/>
@@ -53136,7 +52468,6 @@
               <a:rPr lang="hu-HU" dirty="0"/>
               <a:t>3</a:t>
             </a:r>
-            <a:endParaRPr lang="hu-HU" dirty="0"/>
           </a:p>
         </p:txBody>
       </p:sp>

</xml_diff>

<commit_message>
minimális egészítés programmal plusz kicsi funny
</commit_message>
<xml_diff>
--- a/documentation/PPT/TerFelSzoft.pptx
+++ b/documentation/PPT/TerFelSzoft.pptx
@@ -31638,7 +31638,7 @@
             <a:blip r:embed="rId2">
               <a:extLst>
                 <a:ext uri="{96DAC541-7B7A-43D3-8B79-37D633B846F1}">
-                  <asvg:svgBlip xmlns="" xmlns:asvg="http://schemas.microsoft.com/office/drawing/2016/SVG/main" r:embed="rId3"/>
+                  <asvg:svgBlip xmlns:asvg="http://schemas.microsoft.com/office/drawing/2016/SVG/main" xmlns="" r:embed="rId3"/>
                 </a:ext>
               </a:extLst>
             </a:blip>
@@ -42175,7 +42175,7 @@
             <a:blip r:embed="rId2">
               <a:extLst>
                 <a:ext uri="{96DAC541-7B7A-43D3-8B79-37D633B846F1}">
-                  <asvg:svgBlip xmlns="" xmlns:asvg="http://schemas.microsoft.com/office/drawing/2016/SVG/main" r:embed="rId3"/>
+                  <asvg:svgBlip xmlns:asvg="http://schemas.microsoft.com/office/drawing/2016/SVG/main" xmlns="" r:embed="rId3"/>
                 </a:ext>
               </a:extLst>
             </a:blip>
@@ -46645,7 +46645,6 @@
               <a:rPr lang="hu-HU" dirty="0"/>
               <a:t>Szabó Péter</a:t>
             </a:r>
-            <a:endParaRPr lang="hu-HU" dirty="0"/>
           </a:p>
         </p:txBody>
       </p:sp>
@@ -46860,7 +46859,6 @@
               <a:rPr lang="hu-HU" dirty="0"/>
               <a:t>Prosti</a:t>
             </a:r>
-            <a:endParaRPr lang="hu-HU" dirty="0"/>
           </a:p>
         </p:txBody>
       </p:sp>
@@ -47012,7 +47010,6 @@
               <a:rPr lang="hu-HU" dirty="0"/>
               <a:t>Zámbó Illés</a:t>
             </a:r>
-            <a:endParaRPr lang="hu-HU" dirty="0"/>
           </a:p>
         </p:txBody>
       </p:sp>
@@ -47041,7 +47038,6 @@
               <a:rPr lang="hu-HU" dirty="0"/>
               <a:t>Olcsó külföldi munkaerő</a:t>
             </a:r>
-            <a:endParaRPr lang="hu-HU" dirty="0"/>
           </a:p>
         </p:txBody>
       </p:sp>
@@ -47261,7 +47257,7 @@
             <a:pPr rtl="0"/>
             <a:r>
               <a:rPr lang="hu-HU" dirty="0" smtClean="0"/>
-              <a:t>LOREM IPSUM DOLOR SIT AMET, CONSECTETUER ADIPISCING ELIT. MAECENAS PORTTITOR</a:t>
+              <a:t>Anyagiak</a:t>
             </a:r>
             <a:endParaRPr lang="hu-HU" dirty="0"/>
           </a:p>
@@ -47317,13 +47313,15 @@
         </p:nvSpPr>
         <p:spPr/>
         <p:txBody>
-          <a:bodyPr rtlCol="0"/>
+          <a:bodyPr rtlCol="0">
+            <a:normAutofit fontScale="77500" lnSpcReduction="20000"/>
+          </a:bodyPr>
           <a:lstStyle/>
           <a:p>
             <a:pPr rtl="0"/>
             <a:r>
               <a:rPr lang="hu-HU" dirty="0" smtClean="0"/>
-              <a:t>Kategória címe</a:t>
+              <a:t>Heti alkohol fogyasztás</a:t>
             </a:r>
             <a:endParaRPr lang="hu-HU" dirty="0"/>
           </a:p>
@@ -47379,13 +47377,15 @@
         </p:nvSpPr>
         <p:spPr/>
         <p:txBody>
-          <a:bodyPr rtlCol="0"/>
+          <a:bodyPr rtlCol="0">
+            <a:normAutofit fontScale="77500" lnSpcReduction="20000"/>
+          </a:bodyPr>
           <a:lstStyle/>
           <a:p>
             <a:pPr rtl="0"/>
             <a:r>
               <a:rPr lang="hu-HU" dirty="0" smtClean="0"/>
-              <a:t>Kategória címe</a:t>
+              <a:t>Heti kenyér fogyasztás</a:t>
             </a:r>
             <a:endParaRPr lang="hu-HU" dirty="0"/>
           </a:p>
@@ -47446,8 +47446,8 @@
           <a:p>
             <a:pPr rtl="0"/>
             <a:r>
-              <a:rPr lang="hu-HU" dirty="0" smtClean="0"/>
-              <a:t>Kategória címe</a:t>
+              <a:rPr lang="hu-HU" smtClean="0"/>
+              <a:t>Egyéb</a:t>
             </a:r>
             <a:endParaRPr lang="hu-HU" dirty="0"/>
           </a:p>
@@ -47479,7 +47479,15 @@
             <a:pPr rtl="0"/>
             <a:r>
               <a:rPr lang="hu-HU" dirty="0" smtClean="0"/>
-              <a:t>1 500 000 Ft</a:t>
+              <a:t>1 </a:t>
+            </a:r>
+            <a:r>
+              <a:rPr lang="hu-HU" dirty="0" smtClean="0"/>
+              <a:t>500 000 </a:t>
+            </a:r>
+            <a:r>
+              <a:rPr lang="hu-HU" dirty="0" smtClean="0"/>
+              <a:t>Ft</a:t>
             </a:r>
             <a:endParaRPr lang="hu-HU" dirty="0"/>
           </a:p>
@@ -47499,6 +47507,74 @@
           </p:cNvSpPr>
           <p:nvPr>
             <p:ph type="body" idx="50"/>
+          </p:nvPr>
+        </p:nvSpPr>
+        <p:spPr/>
+        <p:txBody>
+          <a:bodyPr rtlCol="0">
+            <a:normAutofit fontScale="77500" lnSpcReduction="20000"/>
+          </a:bodyPr>
+          <a:lstStyle/>
+          <a:p>
+            <a:pPr rtl="0"/>
+            <a:r>
+              <a:rPr lang="hu-HU" dirty="0" smtClean="0"/>
+              <a:t>Egyéb környezet javító szolgáltatások</a:t>
+            </a:r>
+            <a:endParaRPr lang="hu-HU" dirty="0"/>
+          </a:p>
+        </p:txBody>
+      </p:sp>
+      <p:sp>
+        <p:nvSpPr>
+          <p:cNvPr id="16" name="Szöveg helye 15">
+            <a:extLst>
+              <a:ext uri="{FF2B5EF4-FFF2-40B4-BE49-F238E27FC236}">
+                <a16:creationId xmlns:a16="http://schemas.microsoft.com/office/drawing/2014/main" id="{B3898360-1205-49DF-846A-7D37E0219C01}"/>
+              </a:ext>
+            </a:extLst>
+          </p:cNvPr>
+          <p:cNvSpPr>
+            <a:spLocks noGrp="1"/>
+          </p:cNvSpPr>
+          <p:nvPr>
+            <p:ph type="body" idx="51"/>
+          </p:nvPr>
+        </p:nvSpPr>
+        <p:spPr/>
+        <p:txBody>
+          <a:bodyPr rtlCol="0">
+            <a:normAutofit fontScale="85000" lnSpcReduction="10000"/>
+          </a:bodyPr>
+          <a:lstStyle/>
+          <a:p>
+            <a:pPr rtl="0"/>
+            <a:r>
+              <a:rPr lang="hu-HU" dirty="0" smtClean="0"/>
+              <a:t>25 000 </a:t>
+            </a:r>
+            <a:r>
+              <a:rPr lang="hu-HU" dirty="0" smtClean="0"/>
+              <a:t>000 Ft</a:t>
+            </a:r>
+            <a:endParaRPr lang="hu-HU" dirty="0"/>
+          </a:p>
+        </p:txBody>
+      </p:sp>
+      <p:sp>
+        <p:nvSpPr>
+          <p:cNvPr id="17" name="Szöveg helye 16">
+            <a:extLst>
+              <a:ext uri="{FF2B5EF4-FFF2-40B4-BE49-F238E27FC236}">
+                <a16:creationId xmlns:a16="http://schemas.microsoft.com/office/drawing/2014/main" id="{F24221C2-E578-4DC7-AA80-13816114039D}"/>
+              </a:ext>
+            </a:extLst>
+          </p:cNvPr>
+          <p:cNvSpPr>
+            <a:spLocks noGrp="1"/>
+          </p:cNvSpPr>
+          <p:nvPr>
+            <p:ph type="body" idx="52"/>
           </p:nvPr>
         </p:nvSpPr>
         <p:spPr/>
@@ -47509,7 +47585,7 @@
             <a:pPr rtl="0"/>
             <a:r>
               <a:rPr lang="hu-HU" dirty="0" smtClean="0"/>
-              <a:t>Kategória címe</a:t>
+              <a:t>Napi fűtés</a:t>
             </a:r>
             <a:endParaRPr lang="hu-HU" dirty="0"/>
           </a:p>
@@ -47517,18 +47593,18 @@
       </p:sp>
       <p:sp>
         <p:nvSpPr>
-          <p:cNvPr id="16" name="Szöveg helye 15">
-            <a:extLst>
-              <a:ext uri="{FF2B5EF4-FFF2-40B4-BE49-F238E27FC236}">
-                <a16:creationId xmlns:a16="http://schemas.microsoft.com/office/drawing/2014/main" id="{B3898360-1205-49DF-846A-7D37E0219C01}"/>
-              </a:ext>
-            </a:extLst>
-          </p:cNvPr>
-          <p:cNvSpPr>
-            <a:spLocks noGrp="1"/>
-          </p:cNvSpPr>
-          <p:nvPr>
-            <p:ph type="body" idx="51"/>
+          <p:cNvPr id="18" name="Szöveg helye 17">
+            <a:extLst>
+              <a:ext uri="{FF2B5EF4-FFF2-40B4-BE49-F238E27FC236}">
+                <a16:creationId xmlns:a16="http://schemas.microsoft.com/office/drawing/2014/main" id="{DA322BE0-16AC-4DA8-B14C-E1CFF6F7BB47}"/>
+              </a:ext>
+            </a:extLst>
+          </p:cNvPr>
+          <p:cNvSpPr>
+            <a:spLocks noGrp="1"/>
+          </p:cNvSpPr>
+          <p:nvPr>
+            <p:ph type="body" idx="53"/>
           </p:nvPr>
         </p:nvSpPr>
         <p:spPr/>
@@ -47541,7 +47617,7 @@
             <a:pPr rtl="0"/>
             <a:r>
               <a:rPr lang="hu-HU" dirty="0" smtClean="0"/>
-              <a:t>2 500 000 Ft</a:t>
+              <a:t>1 500 000 Ft</a:t>
             </a:r>
             <a:endParaRPr lang="hu-HU" dirty="0"/>
           </a:p>
@@ -47549,91 +47625,31 @@
       </p:sp>
       <p:sp>
         <p:nvSpPr>
-          <p:cNvPr id="17" name="Szöveg helye 16">
-            <a:extLst>
-              <a:ext uri="{FF2B5EF4-FFF2-40B4-BE49-F238E27FC236}">
-                <a16:creationId xmlns:a16="http://schemas.microsoft.com/office/drawing/2014/main" id="{F24221C2-E578-4DC7-AA80-13816114039D}"/>
-              </a:ext>
-            </a:extLst>
-          </p:cNvPr>
-          <p:cNvSpPr>
-            <a:spLocks noGrp="1"/>
-          </p:cNvSpPr>
-          <p:nvPr>
-            <p:ph type="body" idx="52"/>
+          <p:cNvPr id="19" name="Szöveg helye 18">
+            <a:extLst>
+              <a:ext uri="{FF2B5EF4-FFF2-40B4-BE49-F238E27FC236}">
+                <a16:creationId xmlns:a16="http://schemas.microsoft.com/office/drawing/2014/main" id="{AD114D9F-E5FF-4D6E-AB15-975F8897E15C}"/>
+              </a:ext>
+            </a:extLst>
+          </p:cNvPr>
+          <p:cNvSpPr>
+            <a:spLocks noGrp="1"/>
+          </p:cNvSpPr>
+          <p:nvPr>
+            <p:ph type="body" idx="54"/>
           </p:nvPr>
         </p:nvSpPr>
         <p:spPr/>
         <p:txBody>
-          <a:bodyPr rtlCol="0"/>
-          <a:lstStyle/>
-          <a:p>
-            <a:pPr rtl="0"/>
-            <a:r>
-              <a:rPr lang="hu-HU" dirty="0" smtClean="0"/>
-              <a:t>Kategória címe</a:t>
-            </a:r>
-            <a:endParaRPr lang="hu-HU" dirty="0"/>
-          </a:p>
-        </p:txBody>
-      </p:sp>
-      <p:sp>
-        <p:nvSpPr>
-          <p:cNvPr id="18" name="Szöveg helye 17">
-            <a:extLst>
-              <a:ext uri="{FF2B5EF4-FFF2-40B4-BE49-F238E27FC236}">
-                <a16:creationId xmlns:a16="http://schemas.microsoft.com/office/drawing/2014/main" id="{DA322BE0-16AC-4DA8-B14C-E1CFF6F7BB47}"/>
-              </a:ext>
-            </a:extLst>
-          </p:cNvPr>
-          <p:cNvSpPr>
-            <a:spLocks noGrp="1"/>
-          </p:cNvSpPr>
-          <p:nvPr>
-            <p:ph type="body" idx="53"/>
-          </p:nvPr>
-        </p:nvSpPr>
-        <p:spPr/>
-        <p:txBody>
           <a:bodyPr rtlCol="0">
-            <a:normAutofit fontScale="92500"/>
+            <a:normAutofit fontScale="85000" lnSpcReduction="10000"/>
           </a:bodyPr>
           <a:lstStyle/>
           <a:p>
             <a:pPr rtl="0"/>
             <a:r>
               <a:rPr lang="hu-HU" dirty="0" smtClean="0"/>
-              <a:t>1 500 000 Ft</a:t>
-            </a:r>
-            <a:endParaRPr lang="hu-HU" dirty="0"/>
-          </a:p>
-        </p:txBody>
-      </p:sp>
-      <p:sp>
-        <p:nvSpPr>
-          <p:cNvPr id="19" name="Szöveg helye 18">
-            <a:extLst>
-              <a:ext uri="{FF2B5EF4-FFF2-40B4-BE49-F238E27FC236}">
-                <a16:creationId xmlns:a16="http://schemas.microsoft.com/office/drawing/2014/main" id="{AD114D9F-E5FF-4D6E-AB15-975F8897E15C}"/>
-              </a:ext>
-            </a:extLst>
-          </p:cNvPr>
-          <p:cNvSpPr>
-            <a:spLocks noGrp="1"/>
-          </p:cNvSpPr>
-          <p:nvPr>
-            <p:ph type="body" idx="54"/>
-          </p:nvPr>
-        </p:nvSpPr>
-        <p:spPr/>
-        <p:txBody>
-          <a:bodyPr rtlCol="0"/>
-          <a:lstStyle/>
-          <a:p>
-            <a:pPr rtl="0"/>
-            <a:r>
-              <a:rPr lang="hu-HU" dirty="0" smtClean="0"/>
-              <a:t>Kategória címe</a:t>
+              <a:t>Fejlesztési költségek</a:t>
             </a:r>
             <a:endParaRPr lang="hu-HU" dirty="0"/>
           </a:p>
@@ -51010,7 +51026,6 @@
               <a:rPr lang="hu-HU" dirty="0" smtClean="0"/>
               <a:t>Működik (nem) (-;</a:t>
             </a:r>
-            <a:endParaRPr lang="hu-HU" dirty="0" smtClean="0"/>
           </a:p>
           <a:p>
             <a:pPr rtl="0"/>
@@ -51018,7 +51033,6 @@
               <a:rPr lang="hu-HU" dirty="0" smtClean="0"/>
               <a:t>A program megvizsgálja melyik test van kiválasztva és ahhoz igazítja a szövegeket</a:t>
             </a:r>
-            <a:endParaRPr lang="hu-HU" dirty="0" smtClean="0"/>
           </a:p>
           <a:p>
             <a:pPr rtl="0"/>
@@ -51026,10 +51040,13 @@
               <a:rPr lang="hu-HU" dirty="0" smtClean="0"/>
               <a:t>Nem megadott vagy hibás adatok esetében figyelmezteti egy felugró ablakkal a felhasználót</a:t>
             </a:r>
-            <a:endParaRPr lang="hu-HU" dirty="0" smtClean="0"/>
           </a:p>
           <a:p>
             <a:pPr rtl="0"/>
+            <a:r>
+              <a:rPr lang="hu-HU" dirty="0" smtClean="0"/>
+              <a:t>Sajnálatos módon egy minimális intelligencia szint szükséges</a:t>
+            </a:r>
             <a:endParaRPr lang="hu-HU" dirty="0"/>
           </a:p>
         </p:txBody>
@@ -51289,8 +51306,13 @@
             <a:pPr rtl="0"/>
             <a:r>
               <a:rPr lang="hu-HU" dirty="0" smtClean="0"/>
-              <a:t>LOREM IPSUM DOLOR SIT AMET, CONSECTETUER ADIPISCING ELIT</a:t>
-            </a:r>
+              <a:t>Innovatív letisztult </a:t>
+            </a:r>
+            <a:r>
+              <a:rPr lang="hu-HU" dirty="0" err="1" smtClean="0"/>
+              <a:t>dizályn</a:t>
+            </a:r>
+            <a:endParaRPr lang="hu-HU" dirty="0" smtClean="0"/>
           </a:p>
           <a:p>
             <a:pPr rtl="0"/>
@@ -51326,7 +51348,6 @@
               <a:rPr lang="hu-HU" dirty="0" smtClean="0"/>
               <a:t>A kiválasztott test illusztrálva van</a:t>
             </a:r>
-            <a:endParaRPr lang="hu-HU" dirty="0" smtClean="0"/>
           </a:p>
           <a:p>
             <a:pPr rtl="0"/>
@@ -51334,7 +51355,6 @@
               <a:rPr lang="hu-HU" dirty="0" smtClean="0"/>
               <a:t>Előzmények</a:t>
             </a:r>
-            <a:endParaRPr lang="hu-HU" dirty="0" smtClean="0"/>
           </a:p>
           <a:p>
             <a:pPr rtl="0"/>
@@ -51342,7 +51362,6 @@
               <a:rPr lang="hu-HU" dirty="0" smtClean="0"/>
               <a:t>Szünetmentes számítás</a:t>
             </a:r>
-            <a:endParaRPr lang="hu-HU" dirty="0" smtClean="0"/>
           </a:p>
           <a:p>
             <a:pPr rtl="0"/>

</xml_diff>